<commit_message>
bob and alice screen logged
</commit_message>
<xml_diff>
--- a/PrettyTalker/Alice-and-Bob-Story.pptx
+++ b/PrettyTalker/Alice-and-Bob-Story.pptx
@@ -7,9 +7,9 @@
   <p:sldIdLst>
     <p:sldId id="257" r:id="rId2"/>
     <p:sldId id="259" r:id="rId3"/>
-    <p:sldId id="261" r:id="rId4"/>
-    <p:sldId id="263" r:id="rId5"/>
-    <p:sldId id="264" r:id="rId6"/>
+    <p:sldId id="263" r:id="rId4"/>
+    <p:sldId id="264" r:id="rId5"/>
+    <p:sldId id="266" r:id="rId6"/>
     <p:sldId id="265" r:id="rId7"/>
     <p:sldId id="262" r:id="rId8"/>
     <p:sldId id="256" r:id="rId9"/>
@@ -267,7 +267,7 @@
           <a:lstStyle/>
           <a:p>
             <a:fld id="{F4219D73-85B4-CF46-AADA-44FB92A1BCAE}" type="datetimeFigureOut">
-              <a:t>2020/8/18</a:t>
+              <a:t>2020/8/19</a:t>
             </a:fld>
             <a:endParaRPr kumimoji="1" lang="zh-CN" altLang="en-US"/>
           </a:p>
@@ -463,7 +463,7 @@
           <a:lstStyle/>
           <a:p>
             <a:fld id="{F4219D73-85B4-CF46-AADA-44FB92A1BCAE}" type="datetimeFigureOut">
-              <a:t>2020/8/18</a:t>
+              <a:t>2020/8/19</a:t>
             </a:fld>
             <a:endParaRPr kumimoji="1" lang="zh-CN" altLang="en-US"/>
           </a:p>
@@ -669,7 +669,7 @@
           <a:lstStyle/>
           <a:p>
             <a:fld id="{F4219D73-85B4-CF46-AADA-44FB92A1BCAE}" type="datetimeFigureOut">
-              <a:t>2020/8/18</a:t>
+              <a:t>2020/8/19</a:t>
             </a:fld>
             <a:endParaRPr kumimoji="1" lang="zh-CN" altLang="en-US"/>
           </a:p>
@@ -865,7 +865,7 @@
           <a:lstStyle/>
           <a:p>
             <a:fld id="{F4219D73-85B4-CF46-AADA-44FB92A1BCAE}" type="datetimeFigureOut">
-              <a:t>2020/8/18</a:t>
+              <a:t>2020/8/19</a:t>
             </a:fld>
             <a:endParaRPr kumimoji="1" lang="zh-CN" altLang="en-US"/>
           </a:p>
@@ -1138,7 +1138,7 @@
           <a:lstStyle/>
           <a:p>
             <a:fld id="{F4219D73-85B4-CF46-AADA-44FB92A1BCAE}" type="datetimeFigureOut">
-              <a:t>2020/8/18</a:t>
+              <a:t>2020/8/19</a:t>
             </a:fld>
             <a:endParaRPr kumimoji="1" lang="zh-CN" altLang="en-US"/>
           </a:p>
@@ -1401,7 +1401,7 @@
           <a:lstStyle/>
           <a:p>
             <a:fld id="{F4219D73-85B4-CF46-AADA-44FB92A1BCAE}" type="datetimeFigureOut">
-              <a:t>2020/8/18</a:t>
+              <a:t>2020/8/19</a:t>
             </a:fld>
             <a:endParaRPr kumimoji="1" lang="zh-CN" altLang="en-US"/>
           </a:p>
@@ -1811,7 +1811,7 @@
           <a:lstStyle/>
           <a:p>
             <a:fld id="{F4219D73-85B4-CF46-AADA-44FB92A1BCAE}" type="datetimeFigureOut">
-              <a:t>2020/8/18</a:t>
+              <a:t>2020/8/19</a:t>
             </a:fld>
             <a:endParaRPr kumimoji="1" lang="zh-CN" altLang="en-US"/>
           </a:p>
@@ -1950,7 +1950,7 @@
           <a:lstStyle/>
           <a:p>
             <a:fld id="{F4219D73-85B4-CF46-AADA-44FB92A1BCAE}" type="datetimeFigureOut">
-              <a:t>2020/8/18</a:t>
+              <a:t>2020/8/19</a:t>
             </a:fld>
             <a:endParaRPr kumimoji="1" lang="zh-CN" altLang="en-US"/>
           </a:p>
@@ -2061,7 +2061,7 @@
           <a:lstStyle/>
           <a:p>
             <a:fld id="{F4219D73-85B4-CF46-AADA-44FB92A1BCAE}" type="datetimeFigureOut">
-              <a:t>2020/8/18</a:t>
+              <a:t>2020/8/19</a:t>
             </a:fld>
             <a:endParaRPr kumimoji="1" lang="zh-CN" altLang="en-US"/>
           </a:p>
@@ -2370,7 +2370,7 @@
           <a:lstStyle/>
           <a:p>
             <a:fld id="{F4219D73-85B4-CF46-AADA-44FB92A1BCAE}" type="datetimeFigureOut">
-              <a:t>2020/8/18</a:t>
+              <a:t>2020/8/19</a:t>
             </a:fld>
             <a:endParaRPr kumimoji="1" lang="zh-CN" altLang="en-US"/>
           </a:p>
@@ -2656,7 +2656,7 @@
           <a:lstStyle/>
           <a:p>
             <a:fld id="{F4219D73-85B4-CF46-AADA-44FB92A1BCAE}" type="datetimeFigureOut">
-              <a:t>2020/8/18</a:t>
+              <a:t>2020/8/19</a:t>
             </a:fld>
             <a:endParaRPr kumimoji="1" lang="zh-CN" altLang="en-US"/>
           </a:p>
@@ -2895,7 +2895,7 @@
           </a:lstStyle>
           <a:p>
             <a:fld id="{F4219D73-85B4-CF46-AADA-44FB92A1BCAE}" type="datetimeFigureOut">
-              <a:t>2020/8/18</a:t>
+              <a:t>2020/8/19</a:t>
             </a:fld>
             <a:endParaRPr kumimoji="1" lang="zh-CN" altLang="en-US"/>
           </a:p>
@@ -3325,8 +3325,8 @@
         </p:nvSpPr>
         <p:spPr>
           <a:xfrm>
-            <a:off x="3756303" y="1295551"/>
-            <a:ext cx="5230907" cy="1569660"/>
+            <a:off x="3117191" y="1767792"/>
+            <a:ext cx="6509131" cy="830997"/>
           </a:xfrm>
           <a:prstGeom prst="rect">
             <a:avLst/>
@@ -3342,72 +3342,12 @@
             <a:pPr algn="ctr"/>
             <a:r>
               <a:rPr kumimoji="1" lang="en" altLang="zh-CN" sz="4800" b="1"/>
-              <a:t>A story of two young men</a:t>
+              <a:t>A story of young men</a:t>
             </a:r>
             <a:endParaRPr kumimoji="1" lang="en-US" altLang="zh-CN" sz="4800" b="1"/>
           </a:p>
         </p:txBody>
       </p:sp>
-      <p:pic>
-        <p:nvPicPr>
-          <p:cNvPr id="5" name="图片 4">
-            <a:extLst>
-              <a:ext uri="{FF2B5EF4-FFF2-40B4-BE49-F238E27FC236}">
-                <a16:creationId xmlns:a16="http://schemas.microsoft.com/office/drawing/2014/main" id="{9F63D6BE-2C85-CA46-9854-08CDF6227049}"/>
-              </a:ext>
-            </a:extLst>
-          </p:cNvPr>
-          <p:cNvPicPr>
-            <a:picLocks noChangeAspect="1" noChangeArrowheads="1"/>
-          </p:cNvPicPr>
-          <p:nvPr/>
-        </p:nvPicPr>
-        <p:blipFill>
-          <a:blip r:embed="rId2">
-            <a:extLst>
-              <a:ext uri="{28A0092B-C50C-407E-A947-70E740481C1C}">
-                <a14:useLocalDpi xmlns:a14="http://schemas.microsoft.com/office/drawing/2010/main" val="0"/>
-              </a:ext>
-            </a:extLst>
-          </a:blip>
-          <a:srcRect/>
-          <a:stretch>
-            <a:fillRect/>
-          </a:stretch>
-        </p:blipFill>
-        <p:spPr bwMode="auto">
-          <a:xfrm>
-            <a:off x="5920486" y="4525022"/>
-            <a:ext cx="796271" cy="774275"/>
-          </a:xfrm>
-          <a:prstGeom prst="rect">
-            <a:avLst/>
-          </a:prstGeom>
-          <a:noFill/>
-          <a:ln>
-            <a:noFill/>
-          </a:ln>
-          <a:extLst>
-            <a:ext uri="{909E8E84-426E-40DD-AFC4-6F175D3DCCD1}">
-              <a14:hiddenFill xmlns:a14="http://schemas.microsoft.com/office/drawing/2010/main">
-                <a:solidFill>
-                  <a:srgbClr val="FFFFFF"/>
-                </a:solidFill>
-              </a14:hiddenFill>
-            </a:ext>
-            <a:ext uri="{91240B29-F687-4F45-9708-019B960494DF}">
-              <a14:hiddenLine xmlns:a14="http://schemas.microsoft.com/office/drawing/2010/main" w="9525">
-                <a:solidFill>
-                  <a:srgbClr val="000000"/>
-                </a:solidFill>
-                <a:miter lim="800000"/>
-                <a:headEnd/>
-                <a:tailEnd/>
-              </a14:hiddenLine>
-            </a:ext>
-          </a:extLst>
-        </p:spPr>
-      </p:pic>
       <p:pic>
         <p:nvPicPr>
           <p:cNvPr id="2" name="图片 1">
@@ -3423,7 +3363,7 @@
           <p:nvPr/>
         </p:nvPicPr>
         <p:blipFill>
-          <a:blip r:embed="rId3"/>
+          <a:blip r:embed="rId2"/>
           <a:stretch>
             <a:fillRect/>
           </a:stretch>
@@ -3453,7 +3393,7 @@
           <p:nvPr/>
         </p:nvPicPr>
         <p:blipFill>
-          <a:blip r:embed="rId4"/>
+          <a:blip r:embed="rId3"/>
           <a:stretch>
             <a:fillRect/>
           </a:stretch>
@@ -3483,7 +3423,7 @@
           <p:nvPr/>
         </p:nvPicPr>
         <p:blipFill>
-          <a:blip r:embed="rId5"/>
+          <a:blip r:embed="rId4"/>
           <a:stretch>
             <a:fillRect/>
           </a:stretch>
@@ -3603,6 +3543,70 @@
               <a:t>cathy</a:t>
             </a:r>
             <a:endParaRPr kumimoji="1" lang="zh-CN" altLang="en-US" b="1"/>
+          </a:p>
+        </p:txBody>
+      </p:sp>
+      <p:sp>
+        <p:nvSpPr>
+          <p:cNvPr id="10" name="文本框 9">
+            <a:extLst>
+              <a:ext uri="{FF2B5EF4-FFF2-40B4-BE49-F238E27FC236}">
+                <a16:creationId xmlns:a16="http://schemas.microsoft.com/office/drawing/2014/main" id="{411F4A45-C279-CE45-9A70-2C137C699252}"/>
+              </a:ext>
+            </a:extLst>
+          </p:cNvPr>
+          <p:cNvSpPr txBox="1"/>
+          <p:nvPr/>
+        </p:nvSpPr>
+        <p:spPr>
+          <a:xfrm>
+            <a:off x="5107454" y="5117911"/>
+            <a:ext cx="2342308" cy="646331"/>
+          </a:xfrm>
+          <a:prstGeom prst="rect">
+            <a:avLst/>
+          </a:prstGeom>
+          <a:noFill/>
+        </p:spPr>
+        <p:txBody>
+          <a:bodyPr wrap="none" rtlCol="0">
+            <a:spAutoFit/>
+          </a:bodyPr>
+          <a:lstStyle/>
+          <a:p>
+            <a:r>
+              <a:rPr kumimoji="1" lang="en-US" altLang="zh-CN" b="1" i="1">
+                <a:solidFill>
+                  <a:schemeClr val="tx1">
+                    <a:lumMod val="50000"/>
+                    <a:lumOff val="50000"/>
+                  </a:schemeClr>
+                </a:solidFill>
+              </a:rPr>
+              <a:t>github.com/adoggie</a:t>
+            </a:r>
+          </a:p>
+          <a:p>
+            <a:pPr algn="ctr"/>
+            <a:r>
+              <a:rPr kumimoji="1" lang="en-US" altLang="zh-CN" b="1">
+                <a:solidFill>
+                  <a:schemeClr val="tx1">
+                    <a:lumMod val="50000"/>
+                    <a:lumOff val="50000"/>
+                  </a:schemeClr>
+                </a:solidFill>
+              </a:rPr>
+              <a:t>wx: itsec2018</a:t>
+            </a:r>
+            <a:endParaRPr kumimoji="1" lang="zh-CN" altLang="en-US" b="1">
+              <a:solidFill>
+                <a:schemeClr val="tx1">
+                  <a:lumMod val="50000"/>
+                  <a:lumOff val="50000"/>
+                </a:schemeClr>
+              </a:solidFill>
+            </a:endParaRPr>
           </a:p>
         </p:txBody>
       </p:sp>
@@ -4159,36 +4163,6 @@
           </a:prstGeom>
         </p:spPr>
       </p:pic>
-      <p:pic>
-        <p:nvPicPr>
-          <p:cNvPr id="6" name="图片 5">
-            <a:extLst>
-              <a:ext uri="{FF2B5EF4-FFF2-40B4-BE49-F238E27FC236}">
-                <a16:creationId xmlns:a16="http://schemas.microsoft.com/office/drawing/2014/main" id="{22601EEE-A98A-A443-AD6C-8F8FAB85AA9C}"/>
-              </a:ext>
-            </a:extLst>
-          </p:cNvPr>
-          <p:cNvPicPr>
-            <a:picLocks noChangeAspect="1"/>
-          </p:cNvPicPr>
-          <p:nvPr/>
-        </p:nvPicPr>
-        <p:blipFill>
-          <a:blip r:embed="rId5"/>
-          <a:stretch>
-            <a:fillRect/>
-          </a:stretch>
-        </p:blipFill>
-        <p:spPr>
-          <a:xfrm>
-            <a:off x="9025415" y="4805110"/>
-            <a:ext cx="1084091" cy="979851"/>
-          </a:xfrm>
-          <a:prstGeom prst="rect">
-            <a:avLst/>
-          </a:prstGeom>
-        </p:spPr>
-      </p:pic>
       <p:sp>
         <p:nvSpPr>
           <p:cNvPr id="7" name="文本框 6">
@@ -4276,7 +4250,7 @@
           <p:nvPr/>
         </p:nvPicPr>
         <p:blipFill>
-          <a:blip r:embed="rId6"/>
+          <a:blip r:embed="rId5"/>
           <a:stretch>
             <a:fillRect/>
           </a:stretch>
@@ -4306,7 +4280,7 @@
           <p:nvPr/>
         </p:nvPicPr>
         <p:blipFill>
-          <a:blip r:embed="rId7"/>
+          <a:blip r:embed="rId6"/>
           <a:stretch>
             <a:fillRect/>
           </a:stretch>
@@ -4356,7 +4330,7 @@
             <p:nvPr/>
           </p:nvPicPr>
           <p:blipFill>
-            <a:blip r:embed="rId8"/>
+            <a:blip r:embed="rId7"/>
             <a:stretch>
               <a:fillRect/>
             </a:stretch>
@@ -4386,7 +4360,7 @@
             <p:nvPr/>
           </p:nvPicPr>
           <p:blipFill>
-            <a:blip r:embed="rId9"/>
+            <a:blip r:embed="rId8"/>
             <a:stretch>
               <a:fillRect/>
             </a:stretch>
@@ -4416,7 +4390,7 @@
             <p:nvPr/>
           </p:nvPicPr>
           <p:blipFill>
-            <a:blip r:embed="rId10"/>
+            <a:blip r:embed="rId9"/>
             <a:stretch>
               <a:fillRect/>
             </a:stretch>
@@ -5839,8 +5813,8 @@
         </p:nvSpPr>
         <p:spPr>
           <a:xfrm>
-            <a:off x="4421051" y="1306285"/>
-            <a:ext cx="3090911" cy="584775"/>
+            <a:off x="4926962" y="1301773"/>
+            <a:ext cx="2680542" cy="584775"/>
           </a:xfrm>
           <a:prstGeom prst="rect">
             <a:avLst/>
@@ -5864,7 +5838,7 @@
               <a:rPr kumimoji="1" lang="zh-CN" altLang="en-US" sz="3200">
                 <a:latin typeface="Adobe Gothic Std B" panose="020B0800000000000000" pitchFamily="34" charset="-128"/>
               </a:rPr>
-              <a:t> 需要支持</a:t>
+              <a:t> 技术点</a:t>
             </a:r>
           </a:p>
         </p:txBody>
@@ -5883,8 +5857,8 @@
         </p:nvSpPr>
         <p:spPr>
           <a:xfrm>
-            <a:off x="4421051" y="2509521"/>
-            <a:ext cx="3296095" cy="2619179"/>
+            <a:off x="4811546" y="2193768"/>
+            <a:ext cx="2795958" cy="3362459"/>
           </a:xfrm>
           <a:prstGeom prst="rect">
             <a:avLst/>
@@ -5897,755 +5871,174 @@
           </a:bodyPr>
           <a:lstStyle/>
           <a:p>
-            <a:pPr marL="285750" indent="-285750">
+            <a:pPr marL="514350" indent="-514350">
               <a:lnSpc>
                 <a:spcPct val="150000"/>
               </a:lnSpc>
-              <a:buFont typeface="Wingdings" pitchFamily="2" charset="2"/>
-              <a:buChar char="ü"/>
+              <a:buFont typeface="+mj-lt"/>
+              <a:buAutoNum type="arabicPeriod"/>
             </a:pPr>
             <a:r>
-              <a:rPr kumimoji="1" lang="en-US" altLang="zh-CN" sz="2800">
-                <a:latin typeface="Lantinghei SC Demibold" panose="02000000000000000000" pitchFamily="2" charset="-122"/>
-                <a:ea typeface="Lantinghei SC Demibold" panose="02000000000000000000" pitchFamily="2" charset="-122"/>
+              <a:rPr kumimoji="1" lang="en-US" altLang="zh-CN" sz="2400">
+                <a:latin typeface="Ayuthaya" pitchFamily="2" charset="-34"/>
+                <a:ea typeface="Ayuthaya" pitchFamily="2" charset="-34"/>
+                <a:cs typeface="Ayuthaya" pitchFamily="2" charset="-34"/>
               </a:rPr>
               <a:t>Python</a:t>
             </a:r>
             <a:r>
-              <a:rPr kumimoji="1" lang="zh-CN" altLang="en-US" sz="2800">
-                <a:latin typeface="Lantinghei SC Demibold" panose="02000000000000000000" pitchFamily="2" charset="-122"/>
+              <a:rPr kumimoji="1" lang="zh-CN" altLang="en-US" sz="2400">
+                <a:latin typeface="Ayuthaya" pitchFamily="2" charset="-34"/>
                 <a:ea typeface="Lantinghei SC Demibold" panose="02000000000000000000" pitchFamily="2" charset="-122"/>
+                <a:cs typeface="Ayuthaya" pitchFamily="2" charset="-34"/>
               </a:rPr>
               <a:t>语言</a:t>
             </a:r>
-            <a:endParaRPr kumimoji="1" lang="en-US" altLang="zh-CN" sz="2800">
-              <a:latin typeface="Lantinghei SC Demibold" panose="02000000000000000000" pitchFamily="2" charset="-122"/>
-              <a:ea typeface="Lantinghei SC Demibold" panose="02000000000000000000" pitchFamily="2" charset="-122"/>
+            <a:endParaRPr kumimoji="1" lang="en-US" altLang="zh-CN" sz="2400">
+              <a:latin typeface="Ayuthaya" pitchFamily="2" charset="-34"/>
+              <a:ea typeface="Ayuthaya" pitchFamily="2" charset="-34"/>
+              <a:cs typeface="Ayuthaya" pitchFamily="2" charset="-34"/>
             </a:endParaRPr>
           </a:p>
           <a:p>
-            <a:pPr marL="285750" indent="-285750">
+            <a:pPr marL="514350" indent="-514350">
               <a:lnSpc>
                 <a:spcPct val="150000"/>
               </a:lnSpc>
-              <a:buFont typeface="Wingdings" pitchFamily="2" charset="2"/>
-              <a:buChar char="ü"/>
+              <a:buFont typeface="+mj-lt"/>
+              <a:buAutoNum type="arabicPeriod"/>
             </a:pPr>
             <a:r>
-              <a:rPr kumimoji="1" lang="zh-CN" altLang="en-US" sz="2800">
-                <a:latin typeface="Lantinghei SC Demibold" panose="02000000000000000000" pitchFamily="2" charset="-122"/>
-                <a:ea typeface="Lantinghei SC Demibold" panose="02000000000000000000" pitchFamily="2" charset="-122"/>
-              </a:rPr>
-              <a:t>网络 </a:t>
-            </a:r>
-            <a:r>
-              <a:rPr kumimoji="1" lang="en-US" altLang="zh-CN" sz="2800">
-                <a:latin typeface="Lantinghei SC Demibold" panose="02000000000000000000" pitchFamily="2" charset="-122"/>
-                <a:ea typeface="Lantinghei SC Demibold" panose="02000000000000000000" pitchFamily="2" charset="-122"/>
+              <a:rPr kumimoji="1" lang="en-US" altLang="zh-CN" sz="2400">
+                <a:latin typeface="Ayuthaya" pitchFamily="2" charset="-34"/>
+                <a:ea typeface="Ayuthaya" pitchFamily="2" charset="-34"/>
+                <a:cs typeface="Ayuthaya" pitchFamily="2" charset="-34"/>
               </a:rPr>
               <a:t>socket</a:t>
             </a:r>
             <a:r>
-              <a:rPr kumimoji="1" lang="zh-CN" altLang="en-US" sz="2800">
-                <a:latin typeface="Lantinghei SC Demibold" panose="02000000000000000000" pitchFamily="2" charset="-122"/>
+              <a:rPr kumimoji="1" lang="zh-CN" altLang="en-US" sz="2400">
+                <a:latin typeface="Ayuthaya" pitchFamily="2" charset="-34"/>
                 <a:ea typeface="Lantinghei SC Demibold" panose="02000000000000000000" pitchFamily="2" charset="-122"/>
+                <a:cs typeface="Ayuthaya" pitchFamily="2" charset="-34"/>
               </a:rPr>
               <a:t>编程</a:t>
             </a:r>
-            <a:endParaRPr kumimoji="1" lang="en-US" altLang="zh-CN" sz="2800">
-              <a:latin typeface="Lantinghei SC Demibold" panose="02000000000000000000" pitchFamily="2" charset="-122"/>
-              <a:ea typeface="Lantinghei SC Demibold" panose="02000000000000000000" pitchFamily="2" charset="-122"/>
+            <a:endParaRPr kumimoji="1" lang="en-US" altLang="zh-CN" sz="2400">
+              <a:latin typeface="Ayuthaya" pitchFamily="2" charset="-34"/>
+              <a:ea typeface="Ayuthaya" pitchFamily="2" charset="-34"/>
+              <a:cs typeface="Ayuthaya" pitchFamily="2" charset="-34"/>
             </a:endParaRPr>
           </a:p>
           <a:p>
-            <a:pPr marL="285750" indent="-285750">
+            <a:pPr marL="514350" indent="-514350">
               <a:lnSpc>
                 <a:spcPct val="150000"/>
               </a:lnSpc>
-              <a:buFont typeface="Wingdings" pitchFamily="2" charset="2"/>
-              <a:buChar char="ü"/>
+              <a:buFont typeface="+mj-lt"/>
+              <a:buAutoNum type="arabicPeriod"/>
             </a:pPr>
             <a:r>
-              <a:rPr kumimoji="1" lang="en-US" altLang="zh-CN" sz="2800">
-                <a:latin typeface="Lantinghei SC Demibold" panose="02000000000000000000" pitchFamily="2" charset="-122"/>
-                <a:ea typeface="Lantinghei SC Demibold" panose="02000000000000000000" pitchFamily="2" charset="-122"/>
+              <a:rPr kumimoji="1" lang="en-US" altLang="zh-CN" sz="2400">
+                <a:latin typeface="Ayuthaya" pitchFamily="2" charset="-34"/>
+                <a:ea typeface="Ayuthaya" pitchFamily="2" charset="-34"/>
+                <a:cs typeface="Ayuthaya" pitchFamily="2" charset="-34"/>
               </a:rPr>
               <a:t>Thread</a:t>
             </a:r>
             <a:r>
-              <a:rPr kumimoji="1" lang="zh-CN" altLang="en-US" sz="2800">
-                <a:latin typeface="Lantinghei SC Demibold" panose="02000000000000000000" pitchFamily="2" charset="-122"/>
+              <a:rPr kumimoji="1" lang="zh-CN" altLang="en-US" sz="2400">
+                <a:latin typeface="Ayuthaya" pitchFamily="2" charset="-34"/>
                 <a:ea typeface="Lantinghei SC Demibold" panose="02000000000000000000" pitchFamily="2" charset="-122"/>
+                <a:cs typeface="Ayuthaya" pitchFamily="2" charset="-34"/>
               </a:rPr>
               <a:t>线程</a:t>
             </a:r>
-            <a:endParaRPr kumimoji="1" lang="en-US" altLang="zh-CN" sz="2800">
-              <a:latin typeface="Lantinghei SC Demibold" panose="02000000000000000000" pitchFamily="2" charset="-122"/>
-              <a:ea typeface="Lantinghei SC Demibold" panose="02000000000000000000" pitchFamily="2" charset="-122"/>
+            <a:endParaRPr kumimoji="1" lang="en-US" altLang="zh-CN" sz="2400">
+              <a:latin typeface="Ayuthaya" pitchFamily="2" charset="-34"/>
+              <a:ea typeface="Ayuthaya" pitchFamily="2" charset="-34"/>
+              <a:cs typeface="Ayuthaya" pitchFamily="2" charset="-34"/>
             </a:endParaRPr>
           </a:p>
           <a:p>
-            <a:pPr marL="285750" indent="-285750">
+            <a:pPr marL="514350" indent="-514350">
               <a:lnSpc>
                 <a:spcPct val="150000"/>
               </a:lnSpc>
-              <a:buFont typeface="Wingdings" pitchFamily="2" charset="2"/>
-              <a:buChar char="ü"/>
+              <a:buFont typeface="+mj-lt"/>
+              <a:buAutoNum type="arabicPeriod"/>
             </a:pPr>
-            <a:endParaRPr kumimoji="1" lang="en-US" altLang="zh-CN" sz="2800">
-              <a:latin typeface="Lantinghei SC Demibold" panose="02000000000000000000" pitchFamily="2" charset="-122"/>
-              <a:ea typeface="Lantinghei SC Demibold" panose="02000000000000000000" pitchFamily="2" charset="-122"/>
-            </a:endParaRPr>
-          </a:p>
-        </p:txBody>
-      </p:sp>
-      <p:pic>
-        <p:nvPicPr>
-          <p:cNvPr id="14" name="图片 13">
-            <a:extLst>
-              <a:ext uri="{FF2B5EF4-FFF2-40B4-BE49-F238E27FC236}">
-                <a16:creationId xmlns:a16="http://schemas.microsoft.com/office/drawing/2014/main" id="{79E9A9BB-67FD-F042-ACCD-0690DDB3C984}"/>
-              </a:ext>
-            </a:extLst>
-          </p:cNvPr>
-          <p:cNvPicPr>
-            <a:picLocks noChangeAspect="1" noChangeArrowheads="1"/>
-          </p:cNvPicPr>
-          <p:nvPr/>
-        </p:nvPicPr>
-        <p:blipFill>
-          <a:blip r:embed="rId2">
-            <a:extLst>
-              <a:ext uri="{28A0092B-C50C-407E-A947-70E740481C1C}">
-                <a14:useLocalDpi xmlns:a14="http://schemas.microsoft.com/office/drawing/2010/main" val="0"/>
-              </a:ext>
-            </a:extLst>
-          </a:blip>
-          <a:srcRect/>
-          <a:stretch>
-            <a:fillRect/>
-          </a:stretch>
-        </p:blipFill>
-        <p:spPr bwMode="auto">
-          <a:xfrm>
-            <a:off x="1791613" y="2766399"/>
-            <a:ext cx="1571822" cy="1528401"/>
-          </a:xfrm>
-          <a:prstGeom prst="rect">
-            <a:avLst/>
-          </a:prstGeom>
-          <a:noFill/>
-          <a:ln>
-            <a:noFill/>
-          </a:ln>
-          <a:extLst>
-            <a:ext uri="{909E8E84-426E-40DD-AFC4-6F175D3DCCD1}">
-              <a14:hiddenFill xmlns:a14="http://schemas.microsoft.com/office/drawing/2010/main">
-                <a:solidFill>
-                  <a:srgbClr val="FFFFFF"/>
-                </a:solidFill>
-              </a14:hiddenFill>
-            </a:ext>
-            <a:ext uri="{91240B29-F687-4F45-9708-019B960494DF}">
-              <a14:hiddenLine xmlns:a14="http://schemas.microsoft.com/office/drawing/2010/main" w="9525">
-                <a:solidFill>
-                  <a:srgbClr val="000000"/>
-                </a:solidFill>
-                <a:miter lim="800000"/>
-                <a:headEnd/>
-                <a:tailEnd/>
-              </a14:hiddenLine>
-            </a:ext>
-          </a:extLst>
-        </p:spPr>
-      </p:pic>
-    </p:spTree>
-    <p:extLst>
-      <p:ext uri="{BB962C8B-B14F-4D97-AF65-F5344CB8AC3E}">
-        <p14:creationId xmlns:p14="http://schemas.microsoft.com/office/powerpoint/2010/main" val="4133392440"/>
-      </p:ext>
-    </p:extLst>
-  </p:cSld>
-  <p:clrMapOvr>
-    <a:masterClrMapping/>
-  </p:clrMapOvr>
-  <p:timing>
-    <p:tnLst>
-      <p:par>
-        <p:cTn id="1" dur="indefinite" restart="never" nodeType="tmRoot">
-          <p:childTnLst>
-            <p:seq concurrent="1" nextAc="seek">
-              <p:cTn id="2" dur="indefinite" nodeType="mainSeq">
-                <p:childTnLst>
-                  <p:par>
-                    <p:cTn id="3" fill="hold">
-                      <p:stCondLst>
-                        <p:cond delay="indefinite"/>
-                      </p:stCondLst>
-                      <p:childTnLst>
-                        <p:par>
-                          <p:cTn id="4" fill="hold">
-                            <p:stCondLst>
-                              <p:cond delay="0"/>
-                            </p:stCondLst>
-                            <p:childTnLst>
-                              <p:par>
-                                <p:cTn id="5" presetID="26" presetClass="entr" presetSubtype="0" fill="hold" nodeType="clickEffect">
-                                  <p:stCondLst>
-                                    <p:cond delay="0"/>
-                                  </p:stCondLst>
-                                  <p:childTnLst>
-                                    <p:set>
-                                      <p:cBhvr>
-                                        <p:cTn id="6" dur="1" fill="hold">
-                                          <p:stCondLst>
-                                            <p:cond delay="0"/>
-                                          </p:stCondLst>
-                                        </p:cTn>
-                                        <p:tgtEl>
-                                          <p:spTgt spid="14"/>
-                                        </p:tgtEl>
-                                        <p:attrNameLst>
-                                          <p:attrName>style.visibility</p:attrName>
-                                        </p:attrNameLst>
-                                      </p:cBhvr>
-                                      <p:to>
-                                        <p:strVal val="visible"/>
-                                      </p:to>
-                                    </p:set>
-                                    <p:animEffect transition="in" filter="wipe(down)">
-                                      <p:cBhvr>
-                                        <p:cTn id="7" dur="580">
-                                          <p:stCondLst>
-                                            <p:cond delay="0"/>
-                                          </p:stCondLst>
-                                        </p:cTn>
-                                        <p:tgtEl>
-                                          <p:spTgt spid="14"/>
-                                        </p:tgtEl>
-                                      </p:cBhvr>
-                                    </p:animEffect>
-                                    <p:anim calcmode="lin" valueType="num">
-                                      <p:cBhvr>
-                                        <p:cTn id="8" dur="1822" tmFilter="0,0; 0.14,0.36; 0.43,0.73; 0.71,0.91; 1.0,1.0">
-                                          <p:stCondLst>
-                                            <p:cond delay="0"/>
-                                          </p:stCondLst>
-                                        </p:cTn>
-                                        <p:tgtEl>
-                                          <p:spTgt spid="14"/>
-                                        </p:tgtEl>
-                                        <p:attrNameLst>
-                                          <p:attrName>ppt_x</p:attrName>
-                                        </p:attrNameLst>
-                                      </p:cBhvr>
-                                      <p:tavLst>
-                                        <p:tav tm="0">
-                                          <p:val>
-                                            <p:strVal val="#ppt_x-0.25"/>
-                                          </p:val>
-                                        </p:tav>
-                                        <p:tav tm="100000">
-                                          <p:val>
-                                            <p:strVal val="#ppt_x"/>
-                                          </p:val>
-                                        </p:tav>
-                                      </p:tavLst>
-                                    </p:anim>
-                                    <p:anim calcmode="lin" valueType="num">
-                                      <p:cBhvr>
-                                        <p:cTn id="9" dur="664" tmFilter="0.0,0.0; 0.25,0.07; 0.50,0.2; 0.75,0.467; 1.0,1.0">
-                                          <p:stCondLst>
-                                            <p:cond delay="0"/>
-                                          </p:stCondLst>
-                                        </p:cTn>
-                                        <p:tgtEl>
-                                          <p:spTgt spid="14"/>
-                                        </p:tgtEl>
-                                        <p:attrNameLst>
-                                          <p:attrName>ppt_y</p:attrName>
-                                        </p:attrNameLst>
-                                      </p:cBhvr>
-                                      <p:tavLst>
-                                        <p:tav tm="0" fmla="#ppt_y-sin(pi*$)/3">
-                                          <p:val>
-                                            <p:fltVal val="0.5"/>
-                                          </p:val>
-                                        </p:tav>
-                                        <p:tav tm="100000">
-                                          <p:val>
-                                            <p:fltVal val="1"/>
-                                          </p:val>
-                                        </p:tav>
-                                      </p:tavLst>
-                                    </p:anim>
-                                    <p:anim calcmode="lin" valueType="num">
-                                      <p:cBhvr>
-                                        <p:cTn id="10" dur="664" tmFilter="0, 0; 0.125,0.2665; 0.25,0.4; 0.375,0.465; 0.5,0.5;  0.625,0.535; 0.75,0.6; 0.875,0.7335; 1,1">
-                                          <p:stCondLst>
-                                            <p:cond delay="664"/>
-                                          </p:stCondLst>
-                                        </p:cTn>
-                                        <p:tgtEl>
-                                          <p:spTgt spid="14"/>
-                                        </p:tgtEl>
-                                        <p:attrNameLst>
-                                          <p:attrName>ppt_y</p:attrName>
-                                        </p:attrNameLst>
-                                      </p:cBhvr>
-                                      <p:tavLst>
-                                        <p:tav tm="0" fmla="#ppt_y-sin(pi*$)/9">
-                                          <p:val>
-                                            <p:fltVal val="0"/>
-                                          </p:val>
-                                        </p:tav>
-                                        <p:tav tm="100000">
-                                          <p:val>
-                                            <p:fltVal val="1"/>
-                                          </p:val>
-                                        </p:tav>
-                                      </p:tavLst>
-                                    </p:anim>
-                                    <p:anim calcmode="lin" valueType="num">
-                                      <p:cBhvr>
-                                        <p:cTn id="11" dur="332" tmFilter="0, 0; 0.125,0.2665; 0.25,0.4; 0.375,0.465; 0.5,0.5;  0.625,0.535; 0.75,0.6; 0.875,0.7335; 1,1">
-                                          <p:stCondLst>
-                                            <p:cond delay="1324"/>
-                                          </p:stCondLst>
-                                        </p:cTn>
-                                        <p:tgtEl>
-                                          <p:spTgt spid="14"/>
-                                        </p:tgtEl>
-                                        <p:attrNameLst>
-                                          <p:attrName>ppt_y</p:attrName>
-                                        </p:attrNameLst>
-                                      </p:cBhvr>
-                                      <p:tavLst>
-                                        <p:tav tm="0" fmla="#ppt_y-sin(pi*$)/27">
-                                          <p:val>
-                                            <p:fltVal val="0"/>
-                                          </p:val>
-                                        </p:tav>
-                                        <p:tav tm="100000">
-                                          <p:val>
-                                            <p:fltVal val="1"/>
-                                          </p:val>
-                                        </p:tav>
-                                      </p:tavLst>
-                                    </p:anim>
-                                    <p:anim calcmode="lin" valueType="num">
-                                      <p:cBhvr>
-                                        <p:cTn id="12" dur="164" tmFilter="0, 0; 0.125,0.2665; 0.25,0.4; 0.375,0.465; 0.5,0.5;  0.625,0.535; 0.75,0.6; 0.875,0.7335; 1,1">
-                                          <p:stCondLst>
-                                            <p:cond delay="1656"/>
-                                          </p:stCondLst>
-                                        </p:cTn>
-                                        <p:tgtEl>
-                                          <p:spTgt spid="14"/>
-                                        </p:tgtEl>
-                                        <p:attrNameLst>
-                                          <p:attrName>ppt_y</p:attrName>
-                                        </p:attrNameLst>
-                                      </p:cBhvr>
-                                      <p:tavLst>
-                                        <p:tav tm="0" fmla="#ppt_y-sin(pi*$)/81">
-                                          <p:val>
-                                            <p:fltVal val="0"/>
-                                          </p:val>
-                                        </p:tav>
-                                        <p:tav tm="100000">
-                                          <p:val>
-                                            <p:fltVal val="1"/>
-                                          </p:val>
-                                        </p:tav>
-                                      </p:tavLst>
-                                    </p:anim>
-                                    <p:animScale>
-                                      <p:cBhvr>
-                                        <p:cTn id="13" dur="26">
-                                          <p:stCondLst>
-                                            <p:cond delay="650"/>
-                                          </p:stCondLst>
-                                        </p:cTn>
-                                        <p:tgtEl>
-                                          <p:spTgt spid="14"/>
-                                        </p:tgtEl>
-                                      </p:cBhvr>
-                                      <p:to x="100000" y="60000"/>
-                                    </p:animScale>
-                                    <p:animScale>
-                                      <p:cBhvr>
-                                        <p:cTn id="14" dur="166" decel="50000">
-                                          <p:stCondLst>
-                                            <p:cond delay="676"/>
-                                          </p:stCondLst>
-                                        </p:cTn>
-                                        <p:tgtEl>
-                                          <p:spTgt spid="14"/>
-                                        </p:tgtEl>
-                                      </p:cBhvr>
-                                      <p:to x="100000" y="100000"/>
-                                    </p:animScale>
-                                    <p:animScale>
-                                      <p:cBhvr>
-                                        <p:cTn id="15" dur="26">
-                                          <p:stCondLst>
-                                            <p:cond delay="1312"/>
-                                          </p:stCondLst>
-                                        </p:cTn>
-                                        <p:tgtEl>
-                                          <p:spTgt spid="14"/>
-                                        </p:tgtEl>
-                                      </p:cBhvr>
-                                      <p:to x="100000" y="80000"/>
-                                    </p:animScale>
-                                    <p:animScale>
-                                      <p:cBhvr>
-                                        <p:cTn id="16" dur="166" decel="50000">
-                                          <p:stCondLst>
-                                            <p:cond delay="1338"/>
-                                          </p:stCondLst>
-                                        </p:cTn>
-                                        <p:tgtEl>
-                                          <p:spTgt spid="14"/>
-                                        </p:tgtEl>
-                                      </p:cBhvr>
-                                      <p:to x="100000" y="100000"/>
-                                    </p:animScale>
-                                    <p:animScale>
-                                      <p:cBhvr>
-                                        <p:cTn id="17" dur="26">
-                                          <p:stCondLst>
-                                            <p:cond delay="1642"/>
-                                          </p:stCondLst>
-                                        </p:cTn>
-                                        <p:tgtEl>
-                                          <p:spTgt spid="14"/>
-                                        </p:tgtEl>
-                                      </p:cBhvr>
-                                      <p:to x="100000" y="90000"/>
-                                    </p:animScale>
-                                    <p:animScale>
-                                      <p:cBhvr>
-                                        <p:cTn id="18" dur="166" decel="50000">
-                                          <p:stCondLst>
-                                            <p:cond delay="1668"/>
-                                          </p:stCondLst>
-                                        </p:cTn>
-                                        <p:tgtEl>
-                                          <p:spTgt spid="14"/>
-                                        </p:tgtEl>
-                                      </p:cBhvr>
-                                      <p:to x="100000" y="100000"/>
-                                    </p:animScale>
-                                    <p:animScale>
-                                      <p:cBhvr>
-                                        <p:cTn id="19" dur="26">
-                                          <p:stCondLst>
-                                            <p:cond delay="1808"/>
-                                          </p:stCondLst>
-                                        </p:cTn>
-                                        <p:tgtEl>
-                                          <p:spTgt spid="14"/>
-                                        </p:tgtEl>
-                                      </p:cBhvr>
-                                      <p:to x="100000" y="95000"/>
-                                    </p:animScale>
-                                    <p:animScale>
-                                      <p:cBhvr>
-                                        <p:cTn id="20" dur="166" decel="50000">
-                                          <p:stCondLst>
-                                            <p:cond delay="1834"/>
-                                          </p:stCondLst>
-                                        </p:cTn>
-                                        <p:tgtEl>
-                                          <p:spTgt spid="14"/>
-                                        </p:tgtEl>
-                                      </p:cBhvr>
-                                      <p:to x="100000" y="100000"/>
-                                    </p:animScale>
-                                  </p:childTnLst>
-                                </p:cTn>
-                              </p:par>
-                            </p:childTnLst>
-                          </p:cTn>
-                        </p:par>
-                      </p:childTnLst>
-                    </p:cTn>
-                  </p:par>
-                </p:childTnLst>
-              </p:cTn>
-              <p:prevCondLst>
-                <p:cond evt="onPrev" delay="0">
-                  <p:tgtEl>
-                    <p:sldTgt/>
-                  </p:tgtEl>
-                </p:cond>
-              </p:prevCondLst>
-              <p:nextCondLst>
-                <p:cond evt="onNext" delay="0">
-                  <p:tgtEl>
-                    <p:sldTgt/>
-                  </p:tgtEl>
-                </p:cond>
-              </p:nextCondLst>
-            </p:seq>
-          </p:childTnLst>
-        </p:cTn>
-      </p:par>
-    </p:tnLst>
-  </p:timing>
-</p:sld>
-</file>
-
-<file path=ppt/slides/slide4.xml><?xml version="1.0" encoding="utf-8"?>
-<p:sld xmlns:a="http://schemas.openxmlformats.org/drawingml/2006/main" xmlns:r="http://schemas.openxmlformats.org/officeDocument/2006/relationships" xmlns:p="http://schemas.openxmlformats.org/presentationml/2006/main">
-  <p:cSld>
-    <p:spTree>
-      <p:nvGrpSpPr>
-        <p:cNvPr id="1" name=""/>
-        <p:cNvGrpSpPr/>
-        <p:nvPr/>
-      </p:nvGrpSpPr>
-      <p:grpSpPr>
-        <a:xfrm>
-          <a:off x="0" y="0"/>
-          <a:ext cx="0" cy="0"/>
-          <a:chOff x="0" y="0"/>
-          <a:chExt cx="0" cy="0"/>
-        </a:xfrm>
-      </p:grpSpPr>
-      <p:sp>
-        <p:nvSpPr>
-          <p:cNvPr id="7" name="文本框 6">
-            <a:extLst>
-              <a:ext uri="{FF2B5EF4-FFF2-40B4-BE49-F238E27FC236}">
-                <a16:creationId xmlns:a16="http://schemas.microsoft.com/office/drawing/2014/main" id="{E710FB5E-8FEA-7A45-A063-86FF66BE558D}"/>
-              </a:ext>
-            </a:extLst>
-          </p:cNvPr>
-          <p:cNvSpPr txBox="1"/>
-          <p:nvPr/>
-        </p:nvSpPr>
-        <p:spPr>
-          <a:xfrm>
-            <a:off x="4421051" y="1306285"/>
-            <a:ext cx="4322017" cy="584775"/>
-          </a:xfrm>
-          <a:prstGeom prst="rect">
-            <a:avLst/>
-          </a:prstGeom>
-          <a:noFill/>
-        </p:spPr>
-        <p:txBody>
-          <a:bodyPr wrap="none" rtlCol="0">
-            <a:spAutoFit/>
-          </a:bodyPr>
-          <a:lstStyle/>
-          <a:p>
-            <a:r>
-              <a:rPr kumimoji="1" lang="zh-CN" altLang="en-US" sz="3200">
-                <a:latin typeface="Adobe Gothic Std B" panose="020B0800000000000000" pitchFamily="34" charset="-128"/>
-                <a:ea typeface="Adobe Gothic Std B" panose="020B0800000000000000" pitchFamily="34" charset="-128"/>
+            <a:r>
+              <a:rPr kumimoji="1" lang="zh-CN" altLang="en-US" sz="2400">
+                <a:latin typeface="Ayuthaya" pitchFamily="2" charset="-34"/>
+                <a:ea typeface="Lantinghei SC Demibold" panose="02000000000000000000" pitchFamily="2" charset="-122"/>
+                <a:cs typeface="Ayuthaya" pitchFamily="2" charset="-34"/>
               </a:rPr>
-              <a:t>安全版</a:t>
-            </a:r>
-            <a:r>
-              <a:rPr kumimoji="1" lang="en-US" altLang="zh-CN" sz="3200">
-                <a:latin typeface="Adobe Gothic Std B" panose="020B0800000000000000" pitchFamily="34" charset="-128"/>
-                <a:ea typeface="Adobe Gothic Std B" panose="020B0800000000000000" pitchFamily="34" charset="-128"/>
+              <a:t>对称加密</a:t>
+            </a:r>
+            <a:r>
+              <a:rPr kumimoji="1" lang="en-US" altLang="zh-CN" sz="2400">
+                <a:latin typeface="Ayuthaya" pitchFamily="2" charset="-34"/>
+                <a:ea typeface="Ayuthaya" pitchFamily="2" charset="-34"/>
+                <a:cs typeface="Ayuthaya" pitchFamily="2" charset="-34"/>
               </a:rPr>
-              <a:t>Talker</a:t>
-            </a:r>
-            <a:r>
-              <a:rPr kumimoji="1" lang="zh-CN" altLang="en-US" sz="3200">
-                <a:latin typeface="Adobe Gothic Std B" panose="020B0800000000000000" pitchFamily="34" charset="-128"/>
-              </a:rPr>
-              <a:t> 需要支持</a:t>
-            </a:r>
-          </a:p>
-        </p:txBody>
-      </p:sp>
-      <p:sp>
-        <p:nvSpPr>
-          <p:cNvPr id="8" name="文本框 7">
-            <a:extLst>
-              <a:ext uri="{FF2B5EF4-FFF2-40B4-BE49-F238E27FC236}">
-                <a16:creationId xmlns:a16="http://schemas.microsoft.com/office/drawing/2014/main" id="{13514735-8AD9-5743-B7B5-969A8DE43871}"/>
-              </a:ext>
-            </a:extLst>
-          </p:cNvPr>
-          <p:cNvSpPr txBox="1"/>
-          <p:nvPr/>
-        </p:nvSpPr>
-        <p:spPr>
-          <a:xfrm>
-            <a:off x="5248365" y="2262779"/>
-            <a:ext cx="3296095" cy="3911840"/>
-          </a:xfrm>
-          <a:prstGeom prst="rect">
-            <a:avLst/>
-          </a:prstGeom>
-          <a:noFill/>
-        </p:spPr>
-        <p:txBody>
-          <a:bodyPr wrap="none" rtlCol="0">
-            <a:spAutoFit/>
-          </a:bodyPr>
-          <a:lstStyle/>
-          <a:p>
-            <a:pPr marL="285750" indent="-285750">
+              <a:t>AES</a:t>
+            </a:r>
+          </a:p>
+          <a:p>
+            <a:pPr marL="514350" indent="-514350">
               <a:lnSpc>
                 <a:spcPct val="150000"/>
               </a:lnSpc>
-              <a:buFont typeface="Wingdings" pitchFamily="2" charset="2"/>
-              <a:buChar char="ü"/>
+              <a:buFont typeface="+mj-lt"/>
+              <a:buAutoNum type="arabicPeriod"/>
             </a:pPr>
             <a:r>
-              <a:rPr kumimoji="1" lang="en-US" altLang="zh-CN" sz="2800">
-                <a:latin typeface="Lantinghei SC Demibold" panose="02000000000000000000" pitchFamily="2" charset="-122"/>
+              <a:rPr kumimoji="1" lang="zh-CN" altLang="en-US" sz="2400">
+                <a:latin typeface="Ayuthaya" pitchFamily="2" charset="-34"/>
                 <a:ea typeface="Lantinghei SC Demibold" panose="02000000000000000000" pitchFamily="2" charset="-122"/>
+                <a:cs typeface="Ayuthaya" pitchFamily="2" charset="-34"/>
               </a:rPr>
-              <a:t>Python</a:t>
-            </a:r>
-            <a:r>
-              <a:rPr kumimoji="1" lang="zh-CN" altLang="en-US" sz="2800">
-                <a:latin typeface="Lantinghei SC Demibold" panose="02000000000000000000" pitchFamily="2" charset="-122"/>
-                <a:ea typeface="Lantinghei SC Demibold" panose="02000000000000000000" pitchFamily="2" charset="-122"/>
+              <a:t>非对称加密</a:t>
+            </a:r>
+            <a:r>
+              <a:rPr kumimoji="1" lang="en-US" altLang="zh-CN" sz="2400">
+                <a:latin typeface="Ayuthaya" pitchFamily="2" charset="-34"/>
+                <a:ea typeface="Ayuthaya" pitchFamily="2" charset="-34"/>
+                <a:cs typeface="Ayuthaya" pitchFamily="2" charset="-34"/>
               </a:rPr>
-              <a:t>语言</a:t>
-            </a:r>
-            <a:endParaRPr kumimoji="1" lang="en-US" altLang="zh-CN" sz="2800">
-              <a:latin typeface="Lantinghei SC Demibold" panose="02000000000000000000" pitchFamily="2" charset="-122"/>
-              <a:ea typeface="Lantinghei SC Demibold" panose="02000000000000000000" pitchFamily="2" charset="-122"/>
-            </a:endParaRPr>
-          </a:p>
-          <a:p>
-            <a:pPr marL="285750" indent="-285750">
+              <a:t>RSA</a:t>
+            </a:r>
+          </a:p>
+          <a:p>
+            <a:pPr marL="514350" indent="-514350">
               <a:lnSpc>
                 <a:spcPct val="150000"/>
               </a:lnSpc>
-              <a:buFont typeface="Wingdings" pitchFamily="2" charset="2"/>
-              <a:buChar char="ü"/>
+              <a:buFont typeface="+mj-lt"/>
+              <a:buAutoNum type="arabicPeriod"/>
             </a:pPr>
             <a:r>
-              <a:rPr kumimoji="1" lang="zh-CN" altLang="en-US" sz="2800">
-                <a:latin typeface="Lantinghei SC Demibold" panose="02000000000000000000" pitchFamily="2" charset="-122"/>
+              <a:rPr kumimoji="1" lang="zh-CN" altLang="en-US" sz="2400">
+                <a:latin typeface="Ayuthaya" pitchFamily="2" charset="-34"/>
                 <a:ea typeface="Lantinghei SC Demibold" panose="02000000000000000000" pitchFamily="2" charset="-122"/>
-              </a:rPr>
-              <a:t>网络 </a:t>
-            </a:r>
-            <a:r>
-              <a:rPr kumimoji="1" lang="en-US" altLang="zh-CN" sz="2800">
-                <a:latin typeface="Lantinghei SC Demibold" panose="02000000000000000000" pitchFamily="2" charset="-122"/>
-                <a:ea typeface="Lantinghei SC Demibold" panose="02000000000000000000" pitchFamily="2" charset="-122"/>
-              </a:rPr>
-              <a:t>socket</a:t>
-            </a:r>
-            <a:r>
-              <a:rPr kumimoji="1" lang="zh-CN" altLang="en-US" sz="2800">
-                <a:latin typeface="Lantinghei SC Demibold" panose="02000000000000000000" pitchFamily="2" charset="-122"/>
-                <a:ea typeface="Lantinghei SC Demibold" panose="02000000000000000000" pitchFamily="2" charset="-122"/>
-              </a:rPr>
-              <a:t>编程</a:t>
-            </a:r>
-            <a:endParaRPr kumimoji="1" lang="en-US" altLang="zh-CN" sz="2800">
-              <a:latin typeface="Lantinghei SC Demibold" panose="02000000000000000000" pitchFamily="2" charset="-122"/>
-              <a:ea typeface="Lantinghei SC Demibold" panose="02000000000000000000" pitchFamily="2" charset="-122"/>
-            </a:endParaRPr>
-          </a:p>
-          <a:p>
-            <a:pPr marL="285750" indent="-285750">
-              <a:lnSpc>
-                <a:spcPct val="150000"/>
-              </a:lnSpc>
-              <a:buFont typeface="Wingdings" pitchFamily="2" charset="2"/>
-              <a:buChar char="ü"/>
-            </a:pPr>
-            <a:r>
-              <a:rPr kumimoji="1" lang="en-US" altLang="zh-CN" sz="2800">
-                <a:latin typeface="Lantinghei SC Demibold" panose="02000000000000000000" pitchFamily="2" charset="-122"/>
-                <a:ea typeface="Lantinghei SC Demibold" panose="02000000000000000000" pitchFamily="2" charset="-122"/>
-              </a:rPr>
-              <a:t>Thread</a:t>
-            </a:r>
-            <a:r>
-              <a:rPr kumimoji="1" lang="zh-CN" altLang="en-US" sz="2800">
-                <a:latin typeface="Lantinghei SC Demibold" panose="02000000000000000000" pitchFamily="2" charset="-122"/>
-                <a:ea typeface="Lantinghei SC Demibold" panose="02000000000000000000" pitchFamily="2" charset="-122"/>
-              </a:rPr>
-              <a:t>线程</a:t>
-            </a:r>
-            <a:endParaRPr kumimoji="1" lang="en-US" altLang="zh-CN" sz="2800">
-              <a:latin typeface="Lantinghei SC Demibold" panose="02000000000000000000" pitchFamily="2" charset="-122"/>
-              <a:ea typeface="Lantinghei SC Demibold" panose="02000000000000000000" pitchFamily="2" charset="-122"/>
-            </a:endParaRPr>
-          </a:p>
-          <a:p>
-            <a:pPr marL="285750" indent="-285750">
-              <a:lnSpc>
-                <a:spcPct val="150000"/>
-              </a:lnSpc>
-              <a:buFont typeface="Wingdings" pitchFamily="2" charset="2"/>
-              <a:buChar char="ü"/>
-            </a:pPr>
-            <a:r>
-              <a:rPr kumimoji="1" lang="zh-CN" altLang="en-US" sz="2800">
-                <a:latin typeface="Lantinghei SC Demibold" panose="02000000000000000000" pitchFamily="2" charset="-122"/>
-                <a:ea typeface="Lantinghei SC Demibold" panose="02000000000000000000" pitchFamily="2" charset="-122"/>
-              </a:rPr>
-              <a:t>对称加密</a:t>
-            </a:r>
-            <a:r>
-              <a:rPr kumimoji="1" lang="en-US" altLang="zh-CN" sz="2800">
-                <a:latin typeface="Lantinghei SC Demibold" panose="02000000000000000000" pitchFamily="2" charset="-122"/>
-                <a:ea typeface="Lantinghei SC Demibold" panose="02000000000000000000" pitchFamily="2" charset="-122"/>
-              </a:rPr>
-              <a:t>AES</a:t>
-            </a:r>
-          </a:p>
-          <a:p>
-            <a:pPr marL="285750" indent="-285750">
-              <a:lnSpc>
-                <a:spcPct val="150000"/>
-              </a:lnSpc>
-              <a:buFont typeface="Wingdings" pitchFamily="2" charset="2"/>
-              <a:buChar char="ü"/>
-            </a:pPr>
-            <a:r>
-              <a:rPr kumimoji="1" lang="zh-CN" altLang="en-US" sz="2800">
-                <a:latin typeface="Lantinghei SC Demibold" panose="02000000000000000000" pitchFamily="2" charset="-122"/>
-                <a:ea typeface="Lantinghei SC Demibold" panose="02000000000000000000" pitchFamily="2" charset="-122"/>
+                <a:cs typeface="Ayuthaya" pitchFamily="2" charset="-34"/>
               </a:rPr>
               <a:t>公钥技术</a:t>
             </a:r>
-            <a:endParaRPr kumimoji="1" lang="en-US" altLang="zh-CN" sz="2800">
-              <a:latin typeface="Lantinghei SC Demibold" panose="02000000000000000000" pitchFamily="2" charset="-122"/>
-              <a:ea typeface="Lantinghei SC Demibold" panose="02000000000000000000" pitchFamily="2" charset="-122"/>
+            <a:r>
+              <a:rPr kumimoji="1" lang="en-US" altLang="zh-CN" sz="2400">
+                <a:latin typeface="Ayuthaya" pitchFamily="2" charset="-34"/>
+                <a:ea typeface="Lantinghei SC Demibold" panose="02000000000000000000" pitchFamily="2" charset="-122"/>
+                <a:cs typeface="Ayuthaya" pitchFamily="2" charset="-34"/>
+              </a:rPr>
+              <a:t> PKI</a:t>
+            </a:r>
+            <a:endParaRPr kumimoji="1" lang="en-US" altLang="zh-CN" sz="2400">
+              <a:latin typeface="Ayuthaya" pitchFamily="2" charset="-34"/>
+              <a:ea typeface="Ayuthaya" pitchFamily="2" charset="-34"/>
+              <a:cs typeface="Ayuthaya" pitchFamily="2" charset="-34"/>
             </a:endParaRPr>
-          </a:p>
-          <a:p>
-            <a:pPr marL="285750" indent="-285750">
-              <a:lnSpc>
-                <a:spcPct val="150000"/>
-              </a:lnSpc>
-              <a:buFont typeface="Wingdings" pitchFamily="2" charset="2"/>
-              <a:buChar char="ü"/>
-            </a:pPr>
-            <a:r>
-              <a:rPr kumimoji="1" lang="zh-CN" altLang="en-US" sz="2800">
-                <a:latin typeface="Lantinghei SC Demibold" panose="02000000000000000000" pitchFamily="2" charset="-122"/>
-                <a:ea typeface="Lantinghei SC Demibold" panose="02000000000000000000" pitchFamily="2" charset="-122"/>
-              </a:rPr>
-              <a:t>非对称加密</a:t>
-            </a:r>
-            <a:r>
-              <a:rPr kumimoji="1" lang="en-US" altLang="zh-CN" sz="2800">
-                <a:latin typeface="Lantinghei SC Demibold" panose="02000000000000000000" pitchFamily="2" charset="-122"/>
-                <a:ea typeface="Lantinghei SC Demibold" panose="02000000000000000000" pitchFamily="2" charset="-122"/>
-              </a:rPr>
-              <a:t>RSA</a:t>
-            </a:r>
           </a:p>
         </p:txBody>
       </p:sp>
@@ -7048,7 +6441,7 @@
 </p:sld>
 </file>
 
-<file path=ppt/slides/slide5.xml><?xml version="1.0" encoding="utf-8"?>
+<file path=ppt/slides/slide4.xml><?xml version="1.0" encoding="utf-8"?>
 <p:sld xmlns:a="http://schemas.openxmlformats.org/drawingml/2006/main" xmlns:r="http://schemas.openxmlformats.org/officeDocument/2006/relationships" xmlns:p="http://schemas.openxmlformats.org/presentationml/2006/main">
   <p:cSld>
     <p:spTree>
@@ -7341,14 +6734,14 @@
           <p:nvPr>
             <p:extLst>
               <p:ext uri="{D42A27DB-BD31-4B8C-83A1-F6EECF244321}">
-                <p14:modId xmlns:p14="http://schemas.microsoft.com/office/powerpoint/2010/main" val="3280155197"/>
+                <p14:modId xmlns:p14="http://schemas.microsoft.com/office/powerpoint/2010/main" val="3685565841"/>
               </p:ext>
             </p:extLst>
           </p:nvPr>
         </p:nvGraphicFramePr>
         <p:xfrm>
-          <a:off x="2694956" y="4628719"/>
-          <a:ext cx="2906410" cy="1112520"/>
+          <a:off x="2838080" y="4628719"/>
+          <a:ext cx="2906410" cy="1107440"/>
         </p:xfrm>
         <a:graphic>
           <a:graphicData uri="http://schemas.openxmlformats.org/drawingml/2006/table">
@@ -7372,7 +6765,7 @@
                   </a:extLst>
                 </a:gridCol>
               </a:tblGrid>
-              <a:tr h="370840">
+              <a:tr h="359320">
                 <a:tc gridSpan="2">
                   <a:txBody>
                     <a:bodyPr/>
@@ -7498,13 +6891,13 @@
           <p:nvPr>
             <p:extLst>
               <p:ext uri="{D42A27DB-BD31-4B8C-83A1-F6EECF244321}">
-                <p14:modId xmlns:p14="http://schemas.microsoft.com/office/powerpoint/2010/main" val="4023870172"/>
+                <p14:modId xmlns:p14="http://schemas.microsoft.com/office/powerpoint/2010/main" val="2454493193"/>
               </p:ext>
             </p:extLst>
           </p:nvPr>
         </p:nvGraphicFramePr>
         <p:xfrm>
-          <a:off x="6784911" y="4628719"/>
+          <a:off x="7239186" y="4440759"/>
           <a:ext cx="2906410" cy="1483360"/>
         </p:xfrm>
         <a:graphic>
@@ -7690,6 +7083,935 @@
 </p:sld>
 </file>
 
+<file path=ppt/slides/slide5.xml><?xml version="1.0" encoding="utf-8"?>
+<p:sld xmlns:a="http://schemas.openxmlformats.org/drawingml/2006/main" xmlns:r="http://schemas.openxmlformats.org/officeDocument/2006/relationships" xmlns:p="http://schemas.openxmlformats.org/presentationml/2006/main">
+  <p:cSld>
+    <p:spTree>
+      <p:nvGrpSpPr>
+        <p:cNvPr id="1" name=""/>
+        <p:cNvGrpSpPr/>
+        <p:nvPr/>
+      </p:nvGrpSpPr>
+      <p:grpSpPr>
+        <a:xfrm>
+          <a:off x="0" y="0"/>
+          <a:ext cx="0" cy="0"/>
+          <a:chOff x="0" y="0"/>
+          <a:chExt cx="0" cy="0"/>
+        </a:xfrm>
+      </p:grpSpPr>
+      <p:sp>
+        <p:nvSpPr>
+          <p:cNvPr id="7" name="文本框 6">
+            <a:extLst>
+              <a:ext uri="{FF2B5EF4-FFF2-40B4-BE49-F238E27FC236}">
+                <a16:creationId xmlns:a16="http://schemas.microsoft.com/office/drawing/2014/main" id="{E710FB5E-8FEA-7A45-A063-86FF66BE558D}"/>
+              </a:ext>
+            </a:extLst>
+          </p:cNvPr>
+          <p:cNvSpPr txBox="1"/>
+          <p:nvPr/>
+        </p:nvSpPr>
+        <p:spPr>
+          <a:xfrm>
+            <a:off x="5513148" y="623854"/>
+            <a:ext cx="1269899" cy="584775"/>
+          </a:xfrm>
+          <a:prstGeom prst="rect">
+            <a:avLst/>
+          </a:prstGeom>
+          <a:noFill/>
+        </p:spPr>
+        <p:txBody>
+          <a:bodyPr wrap="none" rtlCol="0">
+            <a:spAutoFit/>
+          </a:bodyPr>
+          <a:lstStyle/>
+          <a:p>
+            <a:r>
+              <a:rPr kumimoji="1" lang="zh-CN" altLang="en-US" sz="3200">
+                <a:latin typeface="Adobe Gothic Std B" panose="020B0800000000000000" pitchFamily="34" charset="-128"/>
+                <a:ea typeface="Adobe Gothic Std B" panose="020B0800000000000000" pitchFamily="34" charset="-128"/>
+              </a:rPr>
+              <a:t>交  互 </a:t>
+            </a:r>
+            <a:endParaRPr kumimoji="1" lang="zh-CN" altLang="en-US" sz="3200">
+              <a:latin typeface="Adobe Gothic Std B" panose="020B0800000000000000" pitchFamily="34" charset="-128"/>
+            </a:endParaRPr>
+          </a:p>
+        </p:txBody>
+      </p:sp>
+      <p:sp>
+        <p:nvSpPr>
+          <p:cNvPr id="22" name="文本框 21">
+            <a:extLst>
+              <a:ext uri="{FF2B5EF4-FFF2-40B4-BE49-F238E27FC236}">
+                <a16:creationId xmlns:a16="http://schemas.microsoft.com/office/drawing/2014/main" id="{43D11FE3-647D-1D48-AE93-CF6262FCA16F}"/>
+              </a:ext>
+            </a:extLst>
+          </p:cNvPr>
+          <p:cNvSpPr txBox="1"/>
+          <p:nvPr/>
+        </p:nvSpPr>
+        <p:spPr>
+          <a:xfrm>
+            <a:off x="9439376" y="2391973"/>
+            <a:ext cx="2084225" cy="523220"/>
+          </a:xfrm>
+          <a:prstGeom prst="rect">
+            <a:avLst/>
+          </a:prstGeom>
+          <a:noFill/>
+        </p:spPr>
+        <p:txBody>
+          <a:bodyPr wrap="none" rtlCol="0">
+            <a:spAutoFit/>
+          </a:bodyPr>
+          <a:lstStyle/>
+          <a:p>
+            <a:pPr marL="285750" indent="-285750">
+              <a:buFont typeface=".Apple Color Emoji UI"/>
+              <a:buChar char="🐟"/>
+            </a:pPr>
+            <a:r>
+              <a:rPr kumimoji="1" lang="en-US" altLang="zh-CN" sz="1400">
+                <a:latin typeface="Ayuthaya" pitchFamily="2" charset="-34"/>
+                <a:ea typeface="Ayuthaya" pitchFamily="2" charset="-34"/>
+                <a:cs typeface="Ayuthaya" pitchFamily="2" charset="-34"/>
+              </a:rPr>
+              <a:t>bob-public.key</a:t>
+            </a:r>
+          </a:p>
+          <a:p>
+            <a:pPr marL="285750" indent="-285750">
+              <a:buFont typeface=".Apple Color Emoji UI"/>
+              <a:buChar char="🐟"/>
+            </a:pPr>
+            <a:r>
+              <a:rPr kumimoji="1" lang="en-US" altLang="zh-CN" sz="1400">
+                <a:latin typeface="Ayuthaya" pitchFamily="2" charset="-34"/>
+                <a:ea typeface="Ayuthaya" pitchFamily="2" charset="-34"/>
+                <a:cs typeface="Ayuthaya" pitchFamily="2" charset="-34"/>
+              </a:rPr>
+              <a:t>bob-private.key</a:t>
+            </a:r>
+            <a:endParaRPr kumimoji="1" lang="zh-CN" altLang="en-US" sz="1400">
+              <a:latin typeface="Ayuthaya" pitchFamily="2" charset="-34"/>
+              <a:cs typeface="Ayuthaya" pitchFamily="2" charset="-34"/>
+            </a:endParaRPr>
+          </a:p>
+        </p:txBody>
+      </p:sp>
+      <p:sp>
+        <p:nvSpPr>
+          <p:cNvPr id="23" name="文本框 22">
+            <a:extLst>
+              <a:ext uri="{FF2B5EF4-FFF2-40B4-BE49-F238E27FC236}">
+                <a16:creationId xmlns:a16="http://schemas.microsoft.com/office/drawing/2014/main" id="{A76A7E52-91F5-0B48-BFA2-E30C94F443DB}"/>
+              </a:ext>
+            </a:extLst>
+          </p:cNvPr>
+          <p:cNvSpPr txBox="1"/>
+          <p:nvPr/>
+        </p:nvSpPr>
+        <p:spPr>
+          <a:xfrm>
+            <a:off x="235852" y="2130363"/>
+            <a:ext cx="2299027" cy="523220"/>
+          </a:xfrm>
+          <a:prstGeom prst="rect">
+            <a:avLst/>
+          </a:prstGeom>
+          <a:noFill/>
+        </p:spPr>
+        <p:txBody>
+          <a:bodyPr wrap="none" rtlCol="0">
+            <a:spAutoFit/>
+          </a:bodyPr>
+          <a:lstStyle/>
+          <a:p>
+            <a:pPr marL="285750" indent="-285750">
+              <a:buFont typeface=".Apple Color Emoji UI"/>
+              <a:buChar char="🐟"/>
+            </a:pPr>
+            <a:r>
+              <a:rPr kumimoji="1" lang="en-US" altLang="zh-CN" sz="1400">
+                <a:latin typeface="Ayuthaya" pitchFamily="2" charset="-34"/>
+                <a:ea typeface="Ayuthaya" pitchFamily="2" charset="-34"/>
+                <a:cs typeface="Ayuthaya" pitchFamily="2" charset="-34"/>
+              </a:rPr>
+              <a:t>alice-public.key</a:t>
+            </a:r>
+          </a:p>
+          <a:p>
+            <a:pPr marL="285750" indent="-285750">
+              <a:buFont typeface=".Apple Color Emoji UI"/>
+              <a:buChar char="🐟"/>
+            </a:pPr>
+            <a:r>
+              <a:rPr kumimoji="1" lang="en-US" altLang="zh-CN" sz="1400">
+                <a:latin typeface="Ayuthaya" pitchFamily="2" charset="-34"/>
+                <a:ea typeface="Ayuthaya" pitchFamily="2" charset="-34"/>
+                <a:cs typeface="Ayuthaya" pitchFamily="2" charset="-34"/>
+              </a:rPr>
+              <a:t>alice-private.key</a:t>
+            </a:r>
+            <a:endParaRPr kumimoji="1" lang="zh-CN" altLang="en-US" sz="1400">
+              <a:latin typeface="Ayuthaya" pitchFamily="2" charset="-34"/>
+              <a:cs typeface="Ayuthaya" pitchFamily="2" charset="-34"/>
+            </a:endParaRPr>
+          </a:p>
+        </p:txBody>
+      </p:sp>
+      <p:cxnSp>
+        <p:nvCxnSpPr>
+          <p:cNvPr id="16" name="直线箭头连接符 15">
+            <a:extLst>
+              <a:ext uri="{FF2B5EF4-FFF2-40B4-BE49-F238E27FC236}">
+                <a16:creationId xmlns:a16="http://schemas.microsoft.com/office/drawing/2014/main" id="{4F9BC069-1804-9B4F-9089-6899BE35AB8C}"/>
+              </a:ext>
+            </a:extLst>
+          </p:cNvPr>
+          <p:cNvCxnSpPr/>
+          <p:nvPr/>
+        </p:nvCxnSpPr>
+        <p:spPr>
+          <a:xfrm>
+            <a:off x="4742992" y="3535519"/>
+            <a:ext cx="2238233" cy="0"/>
+          </a:xfrm>
+          <a:prstGeom prst="straightConnector1">
+            <a:avLst/>
+          </a:prstGeom>
+          <a:noFill/>
+          <a:ln>
+            <a:noFill/>
+            <a:tailEnd type="triangle"/>
+          </a:ln>
+        </p:spPr>
+        <p:style>
+          <a:lnRef idx="1">
+            <a:schemeClr val="accent1"/>
+          </a:lnRef>
+          <a:fillRef idx="0">
+            <a:schemeClr val="accent1"/>
+          </a:fillRef>
+          <a:effectRef idx="0">
+            <a:schemeClr val="accent1"/>
+          </a:effectRef>
+          <a:fontRef idx="minor">
+            <a:schemeClr val="tx1"/>
+          </a:fontRef>
+        </p:style>
+      </p:cxnSp>
+      <p:sp>
+        <p:nvSpPr>
+          <p:cNvPr id="17" name="文本框 16">
+            <a:extLst>
+              <a:ext uri="{FF2B5EF4-FFF2-40B4-BE49-F238E27FC236}">
+                <a16:creationId xmlns:a16="http://schemas.microsoft.com/office/drawing/2014/main" id="{AADB17A5-D528-C34F-8449-1D476ACA53D7}"/>
+              </a:ext>
+            </a:extLst>
+          </p:cNvPr>
+          <p:cNvSpPr txBox="1"/>
+          <p:nvPr/>
+        </p:nvSpPr>
+        <p:spPr>
+          <a:xfrm>
+            <a:off x="4767974" y="3090446"/>
+            <a:ext cx="2380780" cy="338554"/>
+          </a:xfrm>
+          <a:prstGeom prst="rect">
+            <a:avLst/>
+          </a:prstGeom>
+          <a:noFill/>
+          <a:ln>
+            <a:noFill/>
+          </a:ln>
+        </p:spPr>
+        <p:txBody>
+          <a:bodyPr wrap="none" rtlCol="0">
+            <a:spAutoFit/>
+          </a:bodyPr>
+          <a:lstStyle/>
+          <a:p>
+            <a:pPr marL="342900" indent="-342900">
+              <a:buFont typeface="+mj-ea"/>
+              <a:buAutoNum type="circleNumDbPlain"/>
+            </a:pPr>
+            <a:r>
+              <a:rPr kumimoji="1" lang="en-US" altLang="zh-CN" sz="1600">
+                <a:latin typeface="Ayuthaya" pitchFamily="2" charset="-34"/>
+                <a:ea typeface="Ayuthaya" pitchFamily="2" charset="-34"/>
+                <a:cs typeface="Ayuthaya" pitchFamily="2" charset="-34"/>
+              </a:rPr>
+              <a:t>Tcp</a:t>
+            </a:r>
+            <a:r>
+              <a:rPr kumimoji="1" lang="zh-CN" altLang="en-US" sz="1600">
+                <a:latin typeface="Ayuthaya" pitchFamily="2" charset="-34"/>
+                <a:cs typeface="Ayuthaya" pitchFamily="2" charset="-34"/>
+              </a:rPr>
+              <a:t> </a:t>
+            </a:r>
+            <a:r>
+              <a:rPr kumimoji="1" lang="en-US" altLang="zh-CN" sz="1600">
+                <a:latin typeface="Ayuthaya" pitchFamily="2" charset="-34"/>
+                <a:ea typeface="Ayuthaya" pitchFamily="2" charset="-34"/>
+                <a:cs typeface="Ayuthaya" pitchFamily="2" charset="-34"/>
+              </a:rPr>
+              <a:t>Established</a:t>
+            </a:r>
+            <a:endParaRPr kumimoji="1" lang="zh-CN" altLang="en-US" sz="1600">
+              <a:latin typeface="Ayuthaya" pitchFamily="2" charset="-34"/>
+              <a:cs typeface="Ayuthaya" pitchFamily="2" charset="-34"/>
+            </a:endParaRPr>
+          </a:p>
+        </p:txBody>
+      </p:sp>
+      <p:sp>
+        <p:nvSpPr>
+          <p:cNvPr id="18" name="文本框 17">
+            <a:extLst>
+              <a:ext uri="{FF2B5EF4-FFF2-40B4-BE49-F238E27FC236}">
+                <a16:creationId xmlns:a16="http://schemas.microsoft.com/office/drawing/2014/main" id="{2DE64C8D-5A88-C945-8155-60076903D681}"/>
+              </a:ext>
+            </a:extLst>
+          </p:cNvPr>
+          <p:cNvSpPr txBox="1"/>
+          <p:nvPr/>
+        </p:nvSpPr>
+        <p:spPr>
+          <a:xfrm>
+            <a:off x="2536210" y="3826772"/>
+            <a:ext cx="2464136" cy="523220"/>
+          </a:xfrm>
+          <a:prstGeom prst="rect">
+            <a:avLst/>
+          </a:prstGeom>
+          <a:noFill/>
+          <a:ln>
+            <a:noFill/>
+          </a:ln>
+        </p:spPr>
+        <p:txBody>
+          <a:bodyPr wrap="none" rtlCol="0">
+            <a:spAutoFit/>
+          </a:bodyPr>
+          <a:lstStyle/>
+          <a:p>
+            <a:pPr marL="342900" indent="-342900">
+              <a:buFont typeface="+mj-ea"/>
+              <a:buAutoNum type="circleNumDbPlain" startAt="2"/>
+            </a:pPr>
+            <a:r>
+              <a:rPr kumimoji="1" lang="en-US" altLang="zh-CN" sz="1400">
+                <a:solidFill>
+                  <a:srgbClr val="00B0F0"/>
+                </a:solidFill>
+                <a:latin typeface="Ayuthaya" pitchFamily="2" charset="-34"/>
+                <a:ea typeface="Ayuthaya" pitchFamily="2" charset="-34"/>
+                <a:cs typeface="Ayuthaya" pitchFamily="2" charset="-34"/>
+              </a:rPr>
+              <a:t>K = Rand</a:t>
+            </a:r>
+            <a:r>
+              <a:rPr kumimoji="1" lang="zh-CN" altLang="en-US" sz="1400">
+                <a:solidFill>
+                  <a:srgbClr val="00B0F0"/>
+                </a:solidFill>
+                <a:latin typeface="Ayuthaya" pitchFamily="2" charset="-34"/>
+                <a:cs typeface="Ayuthaya" pitchFamily="2" charset="-34"/>
+              </a:rPr>
+              <a:t> </a:t>
+            </a:r>
+            <a:r>
+              <a:rPr kumimoji="1" lang="en-US" altLang="zh-CN" sz="1400">
+                <a:solidFill>
+                  <a:srgbClr val="00B0F0"/>
+                </a:solidFill>
+                <a:latin typeface="Ayuthaya" pitchFamily="2" charset="-34"/>
+                <a:ea typeface="Ayuthaya" pitchFamily="2" charset="-34"/>
+                <a:cs typeface="Ayuthaya" pitchFamily="2" charset="-34"/>
+              </a:rPr>
+              <a:t>Share Key</a:t>
+            </a:r>
+          </a:p>
+          <a:p>
+            <a:pPr marL="342900" indent="-342900">
+              <a:buFont typeface="+mj-ea"/>
+              <a:buAutoNum type="circleNumDbPlain" startAt="2"/>
+            </a:pPr>
+            <a:r>
+              <a:rPr kumimoji="1" lang="en-US" altLang="zh-CN" sz="1400">
+                <a:solidFill>
+                  <a:srgbClr val="00B0F0"/>
+                </a:solidFill>
+                <a:latin typeface="Ayuthaya" pitchFamily="2" charset="-34"/>
+                <a:ea typeface="Ayuthaya" pitchFamily="2" charset="-34"/>
+                <a:cs typeface="Ayuthaya" pitchFamily="2" charset="-34"/>
+              </a:rPr>
+              <a:t>S = RSA(K)</a:t>
+            </a:r>
+            <a:endParaRPr kumimoji="1" lang="zh-CN" altLang="en-US" sz="1400">
+              <a:solidFill>
+                <a:srgbClr val="00B0F0"/>
+              </a:solidFill>
+              <a:latin typeface="Ayuthaya" pitchFamily="2" charset="-34"/>
+              <a:cs typeface="Ayuthaya" pitchFamily="2" charset="-34"/>
+            </a:endParaRPr>
+          </a:p>
+        </p:txBody>
+      </p:sp>
+      <p:sp>
+        <p:nvSpPr>
+          <p:cNvPr id="19" name="文本框 18">
+            <a:extLst>
+              <a:ext uri="{FF2B5EF4-FFF2-40B4-BE49-F238E27FC236}">
+                <a16:creationId xmlns:a16="http://schemas.microsoft.com/office/drawing/2014/main" id="{68F0FD84-A691-3E4D-A2D5-4B983CEE88AA}"/>
+              </a:ext>
+            </a:extLst>
+          </p:cNvPr>
+          <p:cNvSpPr txBox="1"/>
+          <p:nvPr/>
+        </p:nvSpPr>
+        <p:spPr>
+          <a:xfrm>
+            <a:off x="4767974" y="4373798"/>
+            <a:ext cx="2382383" cy="338554"/>
+          </a:xfrm>
+          <a:prstGeom prst="rect">
+            <a:avLst/>
+          </a:prstGeom>
+          <a:noFill/>
+          <a:ln>
+            <a:noFill/>
+          </a:ln>
+        </p:spPr>
+        <p:txBody>
+          <a:bodyPr wrap="none" rtlCol="0">
+            <a:spAutoFit/>
+          </a:bodyPr>
+          <a:lstStyle/>
+          <a:p>
+            <a:pPr marL="342900" indent="-342900">
+              <a:buFont typeface="+mj-ea"/>
+              <a:buAutoNum type="circleNumDbPlain" startAt="4"/>
+            </a:pPr>
+            <a:r>
+              <a:rPr kumimoji="1" lang="en-US" altLang="zh-CN" sz="1600">
+                <a:latin typeface="Ayuthaya" pitchFamily="2" charset="-34"/>
+                <a:ea typeface="Ayuthaya" pitchFamily="2" charset="-34"/>
+                <a:cs typeface="Ayuthaya" pitchFamily="2" charset="-34"/>
+              </a:rPr>
+              <a:t>MessageHello(S)</a:t>
+            </a:r>
+            <a:endParaRPr kumimoji="1" lang="zh-CN" altLang="en-US" sz="1600">
+              <a:latin typeface="Ayuthaya" pitchFamily="2" charset="-34"/>
+              <a:cs typeface="Ayuthaya" pitchFamily="2" charset="-34"/>
+            </a:endParaRPr>
+          </a:p>
+        </p:txBody>
+      </p:sp>
+      <p:sp>
+        <p:nvSpPr>
+          <p:cNvPr id="20" name="文本框 19">
+            <a:extLst>
+              <a:ext uri="{FF2B5EF4-FFF2-40B4-BE49-F238E27FC236}">
+                <a16:creationId xmlns:a16="http://schemas.microsoft.com/office/drawing/2014/main" id="{A0CA89FD-89CA-2C48-B944-C4169670411C}"/>
+              </a:ext>
+            </a:extLst>
+          </p:cNvPr>
+          <p:cNvSpPr txBox="1"/>
+          <p:nvPr/>
+        </p:nvSpPr>
+        <p:spPr>
+          <a:xfrm>
+            <a:off x="2534879" y="4991986"/>
+            <a:ext cx="1927131" cy="307777"/>
+          </a:xfrm>
+          <a:prstGeom prst="rect">
+            <a:avLst/>
+          </a:prstGeom>
+          <a:noFill/>
+          <a:ln>
+            <a:noFill/>
+          </a:ln>
+        </p:spPr>
+        <p:txBody>
+          <a:bodyPr wrap="none" rtlCol="0">
+            <a:spAutoFit/>
+          </a:bodyPr>
+          <a:lstStyle/>
+          <a:p>
+            <a:pPr marL="342900" indent="-342900">
+              <a:buFont typeface="+mj-ea"/>
+              <a:buAutoNum type="circleNumDbPlain" startAt="6"/>
+            </a:pPr>
+            <a:r>
+              <a:rPr kumimoji="1" lang="en-US" altLang="zh-CN" sz="1400">
+                <a:solidFill>
+                  <a:srgbClr val="00B0F0"/>
+                </a:solidFill>
+                <a:latin typeface="Ayuthaya" pitchFamily="2" charset="-34"/>
+                <a:ea typeface="Ayuthaya" pitchFamily="2" charset="-34"/>
+                <a:cs typeface="Ayuthaya" pitchFamily="2" charset="-34"/>
+              </a:rPr>
+              <a:t>C = AES( M,K)</a:t>
+            </a:r>
+            <a:endParaRPr kumimoji="1" lang="zh-CN" altLang="en-US" sz="1400">
+              <a:solidFill>
+                <a:srgbClr val="00B0F0"/>
+              </a:solidFill>
+              <a:latin typeface="Ayuthaya" pitchFamily="2" charset="-34"/>
+              <a:cs typeface="Ayuthaya" pitchFamily="2" charset="-34"/>
+            </a:endParaRPr>
+          </a:p>
+        </p:txBody>
+      </p:sp>
+      <p:cxnSp>
+        <p:nvCxnSpPr>
+          <p:cNvPr id="21" name="直线箭头连接符 20">
+            <a:extLst>
+              <a:ext uri="{FF2B5EF4-FFF2-40B4-BE49-F238E27FC236}">
+                <a16:creationId xmlns:a16="http://schemas.microsoft.com/office/drawing/2014/main" id="{C07A79FE-F5AF-A049-B4F7-7417EEF1FF21}"/>
+              </a:ext>
+            </a:extLst>
+          </p:cNvPr>
+          <p:cNvCxnSpPr/>
+          <p:nvPr/>
+        </p:nvCxnSpPr>
+        <p:spPr>
+          <a:xfrm>
+            <a:off x="4742991" y="4765491"/>
+            <a:ext cx="2238233" cy="0"/>
+          </a:xfrm>
+          <a:prstGeom prst="straightConnector1">
+            <a:avLst/>
+          </a:prstGeom>
+          <a:noFill/>
+          <a:ln>
+            <a:noFill/>
+            <a:tailEnd type="triangle"/>
+          </a:ln>
+        </p:spPr>
+        <p:style>
+          <a:lnRef idx="1">
+            <a:schemeClr val="accent1"/>
+          </a:lnRef>
+          <a:fillRef idx="0">
+            <a:schemeClr val="accent1"/>
+          </a:fillRef>
+          <a:effectRef idx="0">
+            <a:schemeClr val="accent1"/>
+          </a:effectRef>
+          <a:fontRef idx="minor">
+            <a:schemeClr val="tx1"/>
+          </a:fontRef>
+        </p:style>
+      </p:cxnSp>
+      <p:sp>
+        <p:nvSpPr>
+          <p:cNvPr id="24" name="文本框 23">
+            <a:extLst>
+              <a:ext uri="{FF2B5EF4-FFF2-40B4-BE49-F238E27FC236}">
+                <a16:creationId xmlns:a16="http://schemas.microsoft.com/office/drawing/2014/main" id="{A4CE5687-955F-284D-A9C4-B91B0FFFBB62}"/>
+              </a:ext>
+            </a:extLst>
+          </p:cNvPr>
+          <p:cNvSpPr txBox="1"/>
+          <p:nvPr/>
+        </p:nvSpPr>
+        <p:spPr>
+          <a:xfrm>
+            <a:off x="7834449" y="4543075"/>
+            <a:ext cx="1604927" cy="307777"/>
+          </a:xfrm>
+          <a:prstGeom prst="rect">
+            <a:avLst/>
+          </a:prstGeom>
+          <a:noFill/>
+          <a:ln>
+            <a:noFill/>
+          </a:ln>
+        </p:spPr>
+        <p:txBody>
+          <a:bodyPr wrap="none" rtlCol="0">
+            <a:spAutoFit/>
+          </a:bodyPr>
+          <a:lstStyle/>
+          <a:p>
+            <a:pPr marL="342900" indent="-342900">
+              <a:buFont typeface="+mj-ea"/>
+              <a:buAutoNum type="circleNumDbPlain" startAt="5"/>
+            </a:pPr>
+            <a:r>
+              <a:rPr kumimoji="1" lang="en-US" altLang="zh-CN" sz="1400">
+                <a:solidFill>
+                  <a:srgbClr val="C00000"/>
+                </a:solidFill>
+                <a:latin typeface="Ayuthaya" pitchFamily="2" charset="-34"/>
+                <a:ea typeface="Ayuthaya" pitchFamily="2" charset="-34"/>
+                <a:cs typeface="Ayuthaya" pitchFamily="2" charset="-34"/>
+              </a:rPr>
+              <a:t>K = RSA(S)</a:t>
+            </a:r>
+            <a:endParaRPr kumimoji="1" lang="zh-CN" altLang="en-US" sz="1400">
+              <a:solidFill>
+                <a:srgbClr val="C00000"/>
+              </a:solidFill>
+              <a:latin typeface="Ayuthaya" pitchFamily="2" charset="-34"/>
+              <a:cs typeface="Ayuthaya" pitchFamily="2" charset="-34"/>
+            </a:endParaRPr>
+          </a:p>
+        </p:txBody>
+      </p:sp>
+      <p:sp>
+        <p:nvSpPr>
+          <p:cNvPr id="25" name="文本框 24">
+            <a:extLst>
+              <a:ext uri="{FF2B5EF4-FFF2-40B4-BE49-F238E27FC236}">
+                <a16:creationId xmlns:a16="http://schemas.microsoft.com/office/drawing/2014/main" id="{A1BF4B3A-B995-2142-8FCA-5311D16C8515}"/>
+              </a:ext>
+            </a:extLst>
+          </p:cNvPr>
+          <p:cNvSpPr txBox="1"/>
+          <p:nvPr/>
+        </p:nvSpPr>
+        <p:spPr>
+          <a:xfrm>
+            <a:off x="4828888" y="5356706"/>
+            <a:ext cx="2258952" cy="338554"/>
+          </a:xfrm>
+          <a:prstGeom prst="rect">
+            <a:avLst/>
+          </a:prstGeom>
+          <a:noFill/>
+          <a:ln>
+            <a:noFill/>
+          </a:ln>
+        </p:spPr>
+        <p:txBody>
+          <a:bodyPr wrap="none" rtlCol="0">
+            <a:spAutoFit/>
+          </a:bodyPr>
+          <a:lstStyle/>
+          <a:p>
+            <a:pPr marL="342900" indent="-342900">
+              <a:buFont typeface="+mj-ea"/>
+              <a:buAutoNum type="circleNumDbPlain" startAt="7"/>
+            </a:pPr>
+            <a:r>
+              <a:rPr kumimoji="1" lang="en-US" altLang="zh-CN" sz="1600">
+                <a:latin typeface="Ayuthaya" pitchFamily="2" charset="-34"/>
+                <a:ea typeface="Ayuthaya" pitchFamily="2" charset="-34"/>
+                <a:cs typeface="Ayuthaya" pitchFamily="2" charset="-34"/>
+              </a:rPr>
+              <a:t>MessageText(C)</a:t>
+            </a:r>
+            <a:endParaRPr kumimoji="1" lang="zh-CN" altLang="en-US" sz="1600">
+              <a:latin typeface="Ayuthaya" pitchFamily="2" charset="-34"/>
+              <a:cs typeface="Ayuthaya" pitchFamily="2" charset="-34"/>
+            </a:endParaRPr>
+          </a:p>
+        </p:txBody>
+      </p:sp>
+      <p:cxnSp>
+        <p:nvCxnSpPr>
+          <p:cNvPr id="26" name="直线箭头连接符 25">
+            <a:extLst>
+              <a:ext uri="{FF2B5EF4-FFF2-40B4-BE49-F238E27FC236}">
+                <a16:creationId xmlns:a16="http://schemas.microsoft.com/office/drawing/2014/main" id="{41A46D8F-70AB-0347-8DA0-2CEE8E9AFFFF}"/>
+              </a:ext>
+            </a:extLst>
+          </p:cNvPr>
+          <p:cNvCxnSpPr/>
+          <p:nvPr/>
+        </p:nvCxnSpPr>
+        <p:spPr>
+          <a:xfrm>
+            <a:off x="4742991" y="5941757"/>
+            <a:ext cx="2238233" cy="0"/>
+          </a:xfrm>
+          <a:prstGeom prst="straightConnector1">
+            <a:avLst/>
+          </a:prstGeom>
+          <a:noFill/>
+          <a:ln>
+            <a:noFill/>
+            <a:tailEnd type="triangle"/>
+          </a:ln>
+        </p:spPr>
+        <p:style>
+          <a:lnRef idx="1">
+            <a:schemeClr val="accent1"/>
+          </a:lnRef>
+          <a:fillRef idx="0">
+            <a:schemeClr val="accent1"/>
+          </a:fillRef>
+          <a:effectRef idx="0">
+            <a:schemeClr val="accent1"/>
+          </a:effectRef>
+          <a:fontRef idx="minor">
+            <a:schemeClr val="tx1"/>
+          </a:fontRef>
+        </p:style>
+      </p:cxnSp>
+      <p:sp>
+        <p:nvSpPr>
+          <p:cNvPr id="27" name="文本框 26">
+            <a:extLst>
+              <a:ext uri="{FF2B5EF4-FFF2-40B4-BE49-F238E27FC236}">
+                <a16:creationId xmlns:a16="http://schemas.microsoft.com/office/drawing/2014/main" id="{EF3848A0-709C-A449-BF45-D7ADFDD61127}"/>
+              </a:ext>
+            </a:extLst>
+          </p:cNvPr>
+          <p:cNvSpPr txBox="1"/>
+          <p:nvPr/>
+        </p:nvSpPr>
+        <p:spPr>
+          <a:xfrm>
+            <a:off x="7834450" y="5651305"/>
+            <a:ext cx="1604927" cy="307777"/>
+          </a:xfrm>
+          <a:prstGeom prst="rect">
+            <a:avLst/>
+          </a:prstGeom>
+          <a:noFill/>
+          <a:ln>
+            <a:noFill/>
+          </a:ln>
+        </p:spPr>
+        <p:txBody>
+          <a:bodyPr wrap="none" rtlCol="0">
+            <a:spAutoFit/>
+          </a:bodyPr>
+          <a:lstStyle/>
+          <a:p>
+            <a:pPr marL="342900" indent="-342900">
+              <a:buFont typeface="+mj-ea"/>
+              <a:buAutoNum type="circleNumDbPlain" startAt="8"/>
+            </a:pPr>
+            <a:r>
+              <a:rPr kumimoji="1" lang="en-US" altLang="zh-CN" sz="1400">
+                <a:solidFill>
+                  <a:srgbClr val="C00000"/>
+                </a:solidFill>
+                <a:latin typeface="Ayuthaya" pitchFamily="2" charset="-34"/>
+                <a:ea typeface="Ayuthaya" pitchFamily="2" charset="-34"/>
+                <a:cs typeface="Ayuthaya" pitchFamily="2" charset="-34"/>
+              </a:rPr>
+              <a:t>M = AES(C)</a:t>
+            </a:r>
+            <a:endParaRPr kumimoji="1" lang="zh-CN" altLang="en-US" sz="1400">
+              <a:solidFill>
+                <a:srgbClr val="C00000"/>
+              </a:solidFill>
+              <a:latin typeface="Ayuthaya" pitchFamily="2" charset="-34"/>
+              <a:cs typeface="Ayuthaya" pitchFamily="2" charset="-34"/>
+            </a:endParaRPr>
+          </a:p>
+        </p:txBody>
+      </p:sp>
+      <p:pic>
+        <p:nvPicPr>
+          <p:cNvPr id="28" name="图片 5">
+            <a:extLst>
+              <a:ext uri="{FF2B5EF4-FFF2-40B4-BE49-F238E27FC236}">
+                <a16:creationId xmlns:a16="http://schemas.microsoft.com/office/drawing/2014/main" id="{F1534054-2BF1-BD4F-BF89-DBB805BEE135}"/>
+              </a:ext>
+            </a:extLst>
+          </p:cNvPr>
+          <p:cNvPicPr>
+            <a:picLocks noChangeAspect="1" noChangeArrowheads="1"/>
+          </p:cNvPicPr>
+          <p:nvPr/>
+        </p:nvPicPr>
+        <p:blipFill>
+          <a:blip r:embed="rId2">
+            <a:extLst>
+              <a:ext uri="{28A0092B-C50C-407E-A947-70E740481C1C}">
+                <a14:useLocalDpi xmlns:a14="http://schemas.microsoft.com/office/drawing/2010/main" val="0"/>
+              </a:ext>
+            </a:extLst>
+          </a:blip>
+          <a:srcRect/>
+          <a:stretch>
+            <a:fillRect/>
+          </a:stretch>
+        </p:blipFill>
+        <p:spPr bwMode="auto">
+          <a:xfrm>
+            <a:off x="3049715" y="1682935"/>
+            <a:ext cx="6146800" cy="1143000"/>
+          </a:xfrm>
+          <a:prstGeom prst="rect">
+            <a:avLst/>
+          </a:prstGeom>
+          <a:noFill/>
+          <a:ln>
+            <a:noFill/>
+          </a:ln>
+          <a:extLst>
+            <a:ext uri="{909E8E84-426E-40DD-AFC4-6F175D3DCCD1}">
+              <a14:hiddenFill xmlns:a14="http://schemas.microsoft.com/office/drawing/2010/main">
+                <a:solidFill>
+                  <a:srgbClr val="FFFFFF"/>
+                </a:solidFill>
+              </a14:hiddenFill>
+            </a:ext>
+            <a:ext uri="{91240B29-F687-4F45-9708-019B960494DF}">
+              <a14:hiddenLine xmlns:a14="http://schemas.microsoft.com/office/drawing/2010/main" w="9525">
+                <a:solidFill>
+                  <a:srgbClr val="000000"/>
+                </a:solidFill>
+                <a:miter lim="800000"/>
+                <a:headEnd/>
+                <a:tailEnd/>
+              </a14:hiddenLine>
+            </a:ext>
+          </a:extLst>
+        </p:spPr>
+      </p:pic>
+      <p:cxnSp>
+        <p:nvCxnSpPr>
+          <p:cNvPr id="31" name="直线箭头连接符 30">
+            <a:extLst>
+              <a:ext uri="{FF2B5EF4-FFF2-40B4-BE49-F238E27FC236}">
+                <a16:creationId xmlns:a16="http://schemas.microsoft.com/office/drawing/2014/main" id="{00AE69A7-1A9D-1B44-B4CD-36ABBA05F232}"/>
+              </a:ext>
+            </a:extLst>
+          </p:cNvPr>
+          <p:cNvCxnSpPr/>
+          <p:nvPr/>
+        </p:nvCxnSpPr>
+        <p:spPr>
+          <a:xfrm>
+            <a:off x="4767974" y="3535519"/>
+            <a:ext cx="2760248" cy="0"/>
+          </a:xfrm>
+          <a:prstGeom prst="straightConnector1">
+            <a:avLst/>
+          </a:prstGeom>
+          <a:ln w="31750">
+            <a:solidFill>
+              <a:schemeClr val="tx1"/>
+            </a:solidFill>
+            <a:tailEnd type="triangle"/>
+          </a:ln>
+        </p:spPr>
+        <p:style>
+          <a:lnRef idx="1">
+            <a:schemeClr val="accent1"/>
+          </a:lnRef>
+          <a:fillRef idx="0">
+            <a:schemeClr val="accent1"/>
+          </a:fillRef>
+          <a:effectRef idx="0">
+            <a:schemeClr val="accent1"/>
+          </a:effectRef>
+          <a:fontRef idx="minor">
+            <a:schemeClr val="tx1"/>
+          </a:fontRef>
+        </p:style>
+      </p:cxnSp>
+      <p:cxnSp>
+        <p:nvCxnSpPr>
+          <p:cNvPr id="32" name="直线箭头连接符 31">
+            <a:extLst>
+              <a:ext uri="{FF2B5EF4-FFF2-40B4-BE49-F238E27FC236}">
+                <a16:creationId xmlns:a16="http://schemas.microsoft.com/office/drawing/2014/main" id="{6B00EF0C-8B87-5044-B684-99BE7E964B82}"/>
+              </a:ext>
+            </a:extLst>
+          </p:cNvPr>
+          <p:cNvCxnSpPr/>
+          <p:nvPr/>
+        </p:nvCxnSpPr>
+        <p:spPr>
+          <a:xfrm>
+            <a:off x="4742991" y="4816526"/>
+            <a:ext cx="2760248" cy="0"/>
+          </a:xfrm>
+          <a:prstGeom prst="straightConnector1">
+            <a:avLst/>
+          </a:prstGeom>
+          <a:ln w="31750">
+            <a:solidFill>
+              <a:schemeClr val="tx1"/>
+            </a:solidFill>
+            <a:tailEnd type="triangle"/>
+          </a:ln>
+        </p:spPr>
+        <p:style>
+          <a:lnRef idx="1">
+            <a:schemeClr val="accent1"/>
+          </a:lnRef>
+          <a:fillRef idx="0">
+            <a:schemeClr val="accent1"/>
+          </a:fillRef>
+          <a:effectRef idx="0">
+            <a:schemeClr val="accent1"/>
+          </a:effectRef>
+          <a:fontRef idx="minor">
+            <a:schemeClr val="tx1"/>
+          </a:fontRef>
+        </p:style>
+      </p:cxnSp>
+      <p:cxnSp>
+        <p:nvCxnSpPr>
+          <p:cNvPr id="33" name="直线箭头连接符 32">
+            <a:extLst>
+              <a:ext uri="{FF2B5EF4-FFF2-40B4-BE49-F238E27FC236}">
+                <a16:creationId xmlns:a16="http://schemas.microsoft.com/office/drawing/2014/main" id="{D74F17E4-2E3B-A74E-9305-8DE987A1EBD0}"/>
+              </a:ext>
+            </a:extLst>
+          </p:cNvPr>
+          <p:cNvCxnSpPr/>
+          <p:nvPr/>
+        </p:nvCxnSpPr>
+        <p:spPr>
+          <a:xfrm>
+            <a:off x="4721863" y="5888618"/>
+            <a:ext cx="2760248" cy="0"/>
+          </a:xfrm>
+          <a:prstGeom prst="straightConnector1">
+            <a:avLst/>
+          </a:prstGeom>
+          <a:ln w="31750">
+            <a:solidFill>
+              <a:schemeClr val="tx1"/>
+            </a:solidFill>
+            <a:tailEnd type="triangle"/>
+          </a:ln>
+        </p:spPr>
+        <p:style>
+          <a:lnRef idx="1">
+            <a:schemeClr val="accent1"/>
+          </a:lnRef>
+          <a:fillRef idx="0">
+            <a:schemeClr val="accent1"/>
+          </a:fillRef>
+          <a:effectRef idx="0">
+            <a:schemeClr val="accent1"/>
+          </a:effectRef>
+          <a:fontRef idx="minor">
+            <a:schemeClr val="tx1"/>
+          </a:fontRef>
+        </p:style>
+      </p:cxnSp>
+    </p:spTree>
+    <p:extLst>
+      <p:ext uri="{BB962C8B-B14F-4D97-AF65-F5344CB8AC3E}">
+        <p14:creationId xmlns:p14="http://schemas.microsoft.com/office/powerpoint/2010/main" val="273538437"/>
+      </p:ext>
+    </p:extLst>
+  </p:cSld>
+  <p:clrMapOvr>
+    <a:masterClrMapping/>
+  </p:clrMapOvr>
+</p:sld>
+</file>
+
 <file path=ppt/slides/slide6.xml><?xml version="1.0" encoding="utf-8"?>
 <p:sld xmlns:a="http://schemas.openxmlformats.org/drawingml/2006/main" xmlns:r="http://schemas.openxmlformats.org/officeDocument/2006/relationships" xmlns:p="http://schemas.openxmlformats.org/presentationml/2006/main">
   <p:cSld>
@@ -7770,7 +8092,7 @@
         <p:spPr>
           <a:xfrm>
             <a:off x="1961029" y="2890557"/>
-            <a:ext cx="3768980" cy="369332"/>
+            <a:ext cx="1701107" cy="369332"/>
           </a:xfrm>
           <a:prstGeom prst="rect">
             <a:avLst/>
@@ -7800,7 +8122,7 @@
                 <a:ea typeface="Ayuthaya" pitchFamily="2" charset="-34"/>
                 <a:cs typeface="Ayuthaya" pitchFamily="2" charset="-34"/>
               </a:rPr>
-              <a:t> alice 127.0.0.1 7001</a:t>
+              <a:t> alice</a:t>
             </a:r>
             <a:endParaRPr kumimoji="1" lang="zh-CN" altLang="en-US" b="1">
               <a:latin typeface="Ayuthaya" pitchFamily="2" charset="-34"/>
@@ -7823,7 +8145,7 @@
         </p:nvSpPr>
         <p:spPr>
           <a:xfrm>
-            <a:off x="6787604" y="2890557"/>
+            <a:off x="5354589" y="2888353"/>
             <a:ext cx="1976823" cy="369332"/>
           </a:xfrm>
           <a:prstGeom prst="rect">
@@ -7877,8 +8199,8 @@
         </p:nvSpPr>
         <p:spPr>
           <a:xfrm>
-            <a:off x="2374603" y="3429000"/>
-            <a:ext cx="3631122" cy="369332"/>
+            <a:off x="1961029" y="3396656"/>
+            <a:ext cx="1287532" cy="369332"/>
           </a:xfrm>
           <a:prstGeom prst="rect">
             <a:avLst/>
@@ -7900,7 +8222,7 @@
                 <a:ea typeface="Ayuthaya" pitchFamily="2" charset="-34"/>
                 <a:cs typeface="Ayuthaya" pitchFamily="2" charset="-34"/>
               </a:rPr>
-              <a:t>&gt; conn</a:t>
+              <a:t>conn</a:t>
             </a:r>
             <a:r>
               <a:rPr kumimoji="1" lang="en-US" altLang="zh-CN" b="1">
@@ -7908,7 +8230,7 @@
                 <a:ea typeface="Ayuthaya" pitchFamily="2" charset="-34"/>
                 <a:cs typeface="Ayuthaya" pitchFamily="2" charset="-34"/>
               </a:rPr>
-              <a:t> bob 127.0.0.1 7002</a:t>
+              <a:t> bob</a:t>
             </a:r>
             <a:endParaRPr kumimoji="1" lang="zh-CN" altLang="en-US" b="1">
               <a:latin typeface="Ayuthaya" pitchFamily="2" charset="-34"/>
@@ -7931,51 +8253,8 @@
         </p:nvSpPr>
         <p:spPr>
           <a:xfrm>
-            <a:off x="2389084" y="3902755"/>
-            <a:ext cx="1425390" cy="369332"/>
-          </a:xfrm>
-          <a:prstGeom prst="rect">
-            <a:avLst/>
-          </a:prstGeom>
-          <a:noFill/>
-        </p:spPr>
-        <p:txBody>
-          <a:bodyPr wrap="none" rtlCol="0">
-            <a:spAutoFit/>
-          </a:bodyPr>
-          <a:lstStyle/>
-          <a:p>
-            <a:r>
-              <a:rPr kumimoji="1" lang="en-US" altLang="zh-CN" b="1">
-                <a:latin typeface="Ayuthaya" pitchFamily="2" charset="-34"/>
-                <a:ea typeface="Ayuthaya" pitchFamily="2" charset="-34"/>
-                <a:cs typeface="Ayuthaya" pitchFamily="2" charset="-34"/>
-              </a:rPr>
-              <a:t>talking..</a:t>
-            </a:r>
-            <a:endParaRPr kumimoji="1" lang="zh-CN" altLang="en-US" b="1">
-              <a:latin typeface="Ayuthaya" pitchFamily="2" charset="-34"/>
-              <a:cs typeface="Ayuthaya" pitchFamily="2" charset="-34"/>
-            </a:endParaRPr>
-          </a:p>
-        </p:txBody>
-      </p:sp>
-      <p:sp>
-        <p:nvSpPr>
-          <p:cNvPr id="15" name="文本框 14">
-            <a:extLst>
-              <a:ext uri="{FF2B5EF4-FFF2-40B4-BE49-F238E27FC236}">
-                <a16:creationId xmlns:a16="http://schemas.microsoft.com/office/drawing/2014/main" id="{4FDB32CC-CCD6-194E-BEB0-56E3DB39EDEB}"/>
-              </a:ext>
-            </a:extLst>
-          </p:cNvPr>
-          <p:cNvSpPr txBox="1"/>
-          <p:nvPr/>
-        </p:nvSpPr>
-        <p:spPr>
-          <a:xfrm>
-            <a:off x="2389084" y="4409289"/>
-            <a:ext cx="1287532" cy="369332"/>
+            <a:off x="1975509" y="3861472"/>
+            <a:ext cx="1976823" cy="369332"/>
           </a:xfrm>
           <a:prstGeom prst="rect">
             <a:avLst/>
@@ -7997,12 +8276,17 @@
                 <a:ea typeface="Ayuthaya" pitchFamily="2" charset="-34"/>
                 <a:cs typeface="Ayuthaya" pitchFamily="2" charset="-34"/>
               </a:rPr>
-              <a:t>&gt; !close</a:t>
+              <a:t>send</a:t>
+            </a:r>
+            <a:r>
+              <a:rPr kumimoji="1" lang="en-US" altLang="zh-CN" b="1">
+                <a:latin typeface="Ayuthaya" pitchFamily="2" charset="-34"/>
+                <a:ea typeface="Ayuthaya" pitchFamily="2" charset="-34"/>
+                <a:cs typeface="Ayuthaya" pitchFamily="2" charset="-34"/>
+              </a:rPr>
+              <a:t> xxxooo..</a:t>
             </a:r>
             <a:endParaRPr kumimoji="1" lang="zh-CN" altLang="en-US" b="1">
-              <a:solidFill>
-                <a:srgbClr val="FF0000"/>
-              </a:solidFill>
               <a:latin typeface="Ayuthaya" pitchFamily="2" charset="-34"/>
               <a:cs typeface="Ayuthaya" pitchFamily="2" charset="-34"/>
             </a:endParaRPr>
@@ -8011,10 +8295,10 @@
       </p:sp>
       <p:sp>
         <p:nvSpPr>
-          <p:cNvPr id="16" name="文本框 15">
-            <a:extLst>
-              <a:ext uri="{FF2B5EF4-FFF2-40B4-BE49-F238E27FC236}">
-                <a16:creationId xmlns:a16="http://schemas.microsoft.com/office/drawing/2014/main" id="{2DB2DAF2-B952-4F4E-9399-EE74DBD463E9}"/>
+          <p:cNvPr id="15" name="文本框 14">
+            <a:extLst>
+              <a:ext uri="{FF2B5EF4-FFF2-40B4-BE49-F238E27FC236}">
+                <a16:creationId xmlns:a16="http://schemas.microsoft.com/office/drawing/2014/main" id="{4FDB32CC-CCD6-194E-BEB0-56E3DB39EDEB}"/>
               </a:ext>
             </a:extLst>
           </p:cNvPr>
@@ -8023,8 +8307,8 @@
         </p:nvSpPr>
         <p:spPr>
           <a:xfrm>
-            <a:off x="2389084" y="4915823"/>
-            <a:ext cx="1149674" cy="369332"/>
+            <a:off x="1975652" y="4369067"/>
+            <a:ext cx="873957" cy="369332"/>
           </a:xfrm>
           <a:prstGeom prst="rect">
             <a:avLst/>
@@ -8046,7 +8330,7 @@
                 <a:ea typeface="Ayuthaya" pitchFamily="2" charset="-34"/>
                 <a:cs typeface="Ayuthaya" pitchFamily="2" charset="-34"/>
               </a:rPr>
-              <a:t>&gt; !quit</a:t>
+              <a:t>close</a:t>
             </a:r>
             <a:endParaRPr kumimoji="1" lang="zh-CN" altLang="en-US" b="1">
               <a:solidFill>
@@ -8060,6 +8344,55 @@
       </p:sp>
       <p:sp>
         <p:nvSpPr>
+          <p:cNvPr id="16" name="文本框 15">
+            <a:extLst>
+              <a:ext uri="{FF2B5EF4-FFF2-40B4-BE49-F238E27FC236}">
+                <a16:creationId xmlns:a16="http://schemas.microsoft.com/office/drawing/2014/main" id="{2DB2DAF2-B952-4F4E-9399-EE74DBD463E9}"/>
+              </a:ext>
+            </a:extLst>
+          </p:cNvPr>
+          <p:cNvSpPr txBox="1"/>
+          <p:nvPr/>
+        </p:nvSpPr>
+        <p:spPr>
+          <a:xfrm>
+            <a:off x="1975509" y="4853778"/>
+            <a:ext cx="736099" cy="369332"/>
+          </a:xfrm>
+          <a:prstGeom prst="rect">
+            <a:avLst/>
+          </a:prstGeom>
+          <a:noFill/>
+        </p:spPr>
+        <p:txBody>
+          <a:bodyPr wrap="none" rtlCol="0">
+            <a:spAutoFit/>
+          </a:bodyPr>
+          <a:lstStyle/>
+          <a:p>
+            <a:r>
+              <a:rPr kumimoji="1" lang="en-US" altLang="zh-CN" b="1">
+                <a:solidFill>
+                  <a:srgbClr val="FF0000"/>
+                </a:solidFill>
+                <a:latin typeface="Ayuthaya" pitchFamily="2" charset="-34"/>
+                <a:ea typeface="Ayuthaya" pitchFamily="2" charset="-34"/>
+                <a:cs typeface="Ayuthaya" pitchFamily="2" charset="-34"/>
+              </a:rPr>
+              <a:t>quit</a:t>
+            </a:r>
+            <a:endParaRPr kumimoji="1" lang="zh-CN" altLang="en-US" b="1">
+              <a:solidFill>
+                <a:srgbClr val="FF0000"/>
+              </a:solidFill>
+              <a:latin typeface="Ayuthaya" pitchFamily="2" charset="-34"/>
+              <a:cs typeface="Ayuthaya" pitchFamily="2" charset="-34"/>
+            </a:endParaRPr>
+          </a:p>
+        </p:txBody>
+      </p:sp>
+      <p:sp>
+        <p:nvSpPr>
           <p:cNvPr id="4" name="文档 3">
             <a:extLst>
               <a:ext uri="{FF2B5EF4-FFF2-40B4-BE49-F238E27FC236}">
@@ -8072,7 +8405,7 @@
         </p:nvSpPr>
         <p:spPr>
           <a:xfrm>
-            <a:off x="7776016" y="3887408"/>
+            <a:off x="6343001" y="3885204"/>
             <a:ext cx="1716535" cy="691200"/>
           </a:xfrm>
           <a:prstGeom prst="flowChartDocument">
@@ -8127,7 +8460,7 @@
         </p:nvSpPr>
         <p:spPr>
           <a:xfrm>
-            <a:off x="8070695" y="4294042"/>
+            <a:off x="6637680" y="4291838"/>
             <a:ext cx="1716535" cy="691200"/>
           </a:xfrm>
           <a:prstGeom prst="flowChartDocument">
@@ -8185,7 +8518,7 @@
         </p:nvCxnSpPr>
         <p:spPr>
           <a:xfrm rot="16200000" flipH="1">
-            <a:off x="7891391" y="3144514"/>
+            <a:off x="6458376" y="3142310"/>
             <a:ext cx="627519" cy="858268"/>
           </a:xfrm>
           <a:prstGeom prst="curvedConnector3">

</xml_diff>